<commit_message>
se agrega presentacion final
</commit_message>
<xml_diff>
--- a/EA2/Presentacion.pptx
+++ b/EA2/Presentacion.pptx
@@ -6,20 +6,8 @@
   </p:sldMasterIdLst>
   <p:sldIdLst>
     <p:sldId id="256" r:id="rId2"/>
-    <p:sldId id="268" r:id="rId3"/>
-    <p:sldId id="269" r:id="rId4"/>
-    <p:sldId id="270" r:id="rId5"/>
-    <p:sldId id="271" r:id="rId6"/>
-    <p:sldId id="272" r:id="rId7"/>
-    <p:sldId id="277" r:id="rId8"/>
-    <p:sldId id="273" r:id="rId9"/>
-    <p:sldId id="278" r:id="rId10"/>
-    <p:sldId id="279" r:id="rId11"/>
-    <p:sldId id="275" r:id="rId12"/>
-    <p:sldId id="280" r:id="rId13"/>
-    <p:sldId id="281" r:id="rId14"/>
-    <p:sldId id="274" r:id="rId15"/>
-    <p:sldId id="282" r:id="rId16"/>
+    <p:sldId id="257" r:id="rId3"/>
+    <p:sldId id="258" r:id="rId4"/>
   </p:sldIdLst>
   <p:sldSz cx="12192000" cy="6858000"/>
   <p:notesSz cx="6858000" cy="9144000"/>
@@ -8919,7 +8907,7 @@
           <a:p>
             <a:fld id="{6AD6EE87-EBD5-4F12-A48A-63ACA297AC8F}" type="datetimeFigureOut">
               <a:rPr lang="en-US" dirty="0"/>
-              <a:t>5/26/2025</a:t>
+              <a:t>7/13/2025</a:t>
             </a:fld>
             <a:endParaRPr lang="en-US" dirty="0"/>
           </a:p>
@@ -9121,7 +9109,7 @@
           <a:p>
             <a:fld id="{4CD73815-2707-4475-8F1A-B873CB631BB4}" type="datetimeFigureOut">
               <a:rPr lang="en-US" dirty="0"/>
-              <a:t>5/26/2025</a:t>
+              <a:t>7/13/2025</a:t>
             </a:fld>
             <a:endParaRPr lang="en-US" dirty="0"/>
           </a:p>
@@ -9296,7 +9284,7 @@
           <a:p>
             <a:fld id="{2A4AFB99-0EAB-4182-AFF8-E214C82A68F6}" type="datetimeFigureOut">
               <a:rPr lang="en-US" dirty="0"/>
-              <a:t>5/26/2025</a:t>
+              <a:t>7/13/2025</a:t>
             </a:fld>
             <a:endParaRPr lang="en-US" dirty="0"/>
           </a:p>
@@ -9496,7 +9484,7 @@
           <a:p>
             <a:fld id="{A5D3794B-289A-4A80-97D7-111025398D45}" type="datetimeFigureOut">
               <a:rPr lang="en-US" dirty="0"/>
-              <a:t>5/26/2025</a:t>
+              <a:t>7/13/2025</a:t>
             </a:fld>
             <a:endParaRPr lang="en-US" dirty="0"/>
           </a:p>
@@ -18389,7 +18377,7 @@
           <a:p>
             <a:fld id="{5A61015F-7CC6-4D0A-9D87-873EA4C304CC}" type="datetimeFigureOut">
               <a:rPr lang="en-US" dirty="0"/>
-              <a:t>5/26/2025</a:t>
+              <a:t>7/13/2025</a:t>
             </a:fld>
             <a:endParaRPr lang="en-US" dirty="0"/>
           </a:p>
@@ -18658,7 +18646,7 @@
           <a:p>
             <a:fld id="{93C6A301-0538-44EC-B09D-202E1042A48B}" type="datetimeFigureOut">
               <a:rPr lang="en-US" dirty="0"/>
-              <a:t>5/26/2025</a:t>
+              <a:t>7/13/2025</a:t>
             </a:fld>
             <a:endParaRPr lang="en-US" dirty="0"/>
           </a:p>
@@ -19051,7 +19039,7 @@
           <a:p>
             <a:fld id="{D789574A-8875-45EF-8EA2-3CAA0F7ABC4C}" type="datetimeFigureOut">
               <a:rPr lang="en-US" dirty="0"/>
-              <a:t>5/26/2025</a:t>
+              <a:t>7/13/2025</a:t>
             </a:fld>
             <a:endParaRPr lang="en-US" dirty="0"/>
           </a:p>
@@ -19164,7 +19152,7 @@
           <a:p>
             <a:fld id="{67EF4D4C-5367-4C26-9E2B-D8088D7FCA81}" type="datetimeFigureOut">
               <a:rPr lang="en-US" dirty="0"/>
-              <a:t>5/26/2025</a:t>
+              <a:t>7/13/2025</a:t>
             </a:fld>
             <a:endParaRPr lang="en-US" dirty="0"/>
           </a:p>
@@ -19254,7 +19242,7 @@
           <a:p>
             <a:fld id="{56E91E96-98B0-4413-9547-46F3504108EF}" type="datetimeFigureOut">
               <a:rPr lang="en-US" dirty="0"/>
-              <a:t>5/26/2025</a:t>
+              <a:t>7/13/2025</a:t>
             </a:fld>
             <a:endParaRPr lang="en-US" dirty="0"/>
           </a:p>
@@ -19539,7 +19527,7 @@
           <a:p>
             <a:fld id="{05C68B11-C5A8-448C-8CE9-B1A273C79CFC}" type="datetimeFigureOut">
               <a:rPr lang="en-US" dirty="0"/>
-              <a:t>5/26/2025</a:t>
+              <a:t>7/13/2025</a:t>
             </a:fld>
             <a:endParaRPr lang="en-US" dirty="0"/>
           </a:p>
@@ -19814,7 +19802,7 @@
           <a:p>
             <a:fld id="{C7616CA0-919D-4A49-9C8A-62FDFB3A5183}" type="datetimeFigureOut">
               <a:rPr lang="en-US" dirty="0"/>
-              <a:t>5/26/2025</a:t>
+              <a:t>7/13/2025</a:t>
             </a:fld>
             <a:endParaRPr lang="en-US" dirty="0"/>
           </a:p>
@@ -20060,7 +20048,7 @@
             <a:fld id="{90298CD5-6C1E-4009-B41F-6DF62E31D3BE}" type="datetimeFigureOut">
               <a:rPr lang="en-US" dirty="0"/>
               <a:pPr/>
-              <a:t>5/26/2025</a:t>
+              <a:t>7/13/2025</a:t>
             </a:fld>
             <a:endParaRPr lang="en-US" dirty="0"/>
           </a:p>
@@ -20679,1241 +20667,7 @@
 </p:sld>
 </file>
 
-<file path=ppt/slides/slide10.xml><?xml version="1.0" encoding="utf-8"?>
-<p:sld xmlns:a="http://schemas.openxmlformats.org/drawingml/2006/main" xmlns:r="http://schemas.openxmlformats.org/officeDocument/2006/relationships" xmlns:p="http://schemas.openxmlformats.org/presentationml/2006/main">
-  <p:cSld>
-    <p:spTree>
-      <p:nvGrpSpPr>
-        <p:cNvPr id="1" name=""/>
-        <p:cNvGrpSpPr/>
-        <p:nvPr/>
-      </p:nvGrpSpPr>
-      <p:grpSpPr>
-        <a:xfrm>
-          <a:off x="0" y="0"/>
-          <a:ext cx="0" cy="0"/>
-          <a:chOff x="0" y="0"/>
-          <a:chExt cx="0" cy="0"/>
-        </a:xfrm>
-      </p:grpSpPr>
-      <p:sp>
-        <p:nvSpPr>
-          <p:cNvPr id="2" name="Título 1">
-            <a:extLst>
-              <a:ext uri="{FF2B5EF4-FFF2-40B4-BE49-F238E27FC236}">
-                <a16:creationId xmlns:a16="http://schemas.microsoft.com/office/drawing/2014/main" id="{2C6ACC93-A088-BEB2-174E-B50413984883}"/>
-              </a:ext>
-            </a:extLst>
-          </p:cNvPr>
-          <p:cNvSpPr>
-            <a:spLocks noGrp="1"/>
-          </p:cNvSpPr>
-          <p:nvPr>
-            <p:ph type="title"/>
-          </p:nvPr>
-        </p:nvSpPr>
-        <p:spPr/>
-        <p:txBody>
-          <a:bodyPr/>
-          <a:lstStyle/>
-          <a:p>
-            <a:r>
-              <a:rPr lang="en-US" dirty="0" err="1"/>
-              <a:t>Clases</a:t>
-            </a:r>
-            <a:r>
-              <a:rPr lang="en-US" dirty="0"/>
-              <a:t> e interfaces </a:t>
-            </a:r>
-            <a:r>
-              <a:rPr lang="en-US" dirty="0" err="1"/>
-              <a:t>en</a:t>
-            </a:r>
-            <a:r>
-              <a:rPr lang="en-US" dirty="0"/>
-              <a:t> Java</a:t>
-            </a:r>
-          </a:p>
-        </p:txBody>
-      </p:sp>
-      <p:pic>
-        <p:nvPicPr>
-          <p:cNvPr id="9" name="Marcador de contenido 8" descr="Texto&#10;&#10;El contenido generado por IA puede ser incorrecto.">
-            <a:extLst>
-              <a:ext uri="{FF2B5EF4-FFF2-40B4-BE49-F238E27FC236}">
-                <a16:creationId xmlns:a16="http://schemas.microsoft.com/office/drawing/2014/main" id="{3386D6CD-FB98-CD20-7614-9384D7C1C969}"/>
-              </a:ext>
-            </a:extLst>
-          </p:cNvPr>
-          <p:cNvPicPr>
-            <a:picLocks noChangeAspect="1"/>
-          </p:cNvPicPr>
-          <p:nvPr/>
-        </p:nvPicPr>
-        <p:blipFill>
-          <a:blip r:embed="rId2"/>
-          <a:stretch>
-            <a:fillRect/>
-          </a:stretch>
-        </p:blipFill>
-        <p:spPr>
-          <a:xfrm>
-            <a:off x="5515295" y="2428654"/>
-            <a:ext cx="5393028" cy="4022725"/>
-          </a:xfrm>
-          <a:prstGeom prst="rect">
-            <a:avLst/>
-          </a:prstGeom>
-        </p:spPr>
-      </p:pic>
-      <p:pic>
-        <p:nvPicPr>
-          <p:cNvPr id="10" name="Imagen 9" descr="Captura de pantalla de computadora&#10;&#10;El contenido generado por IA puede ser incorrecto.">
-            <a:extLst>
-              <a:ext uri="{FF2B5EF4-FFF2-40B4-BE49-F238E27FC236}">
-                <a16:creationId xmlns:a16="http://schemas.microsoft.com/office/drawing/2014/main" id="{835E3521-B346-ED3B-88E7-6D78B7F40DA8}"/>
-              </a:ext>
-            </a:extLst>
-          </p:cNvPr>
-          <p:cNvPicPr>
-            <a:picLocks noChangeAspect="1"/>
-          </p:cNvPicPr>
-          <p:nvPr/>
-        </p:nvPicPr>
-        <p:blipFill>
-          <a:blip r:embed="rId3"/>
-          <a:stretch>
-            <a:fillRect/>
-          </a:stretch>
-        </p:blipFill>
-        <p:spPr>
-          <a:xfrm>
-            <a:off x="814296" y="2343843"/>
-            <a:ext cx="3787468" cy="4107536"/>
-          </a:xfrm>
-          <a:prstGeom prst="rect">
-            <a:avLst/>
-          </a:prstGeom>
-        </p:spPr>
-      </p:pic>
-      <p:sp>
-        <p:nvSpPr>
-          <p:cNvPr id="11" name="CuadroTexto 10">
-            <a:extLst>
-              <a:ext uri="{FF2B5EF4-FFF2-40B4-BE49-F238E27FC236}">
-                <a16:creationId xmlns:a16="http://schemas.microsoft.com/office/drawing/2014/main" id="{22B4AA0D-0265-EC71-28F6-0F9397917D05}"/>
-              </a:ext>
-            </a:extLst>
-          </p:cNvPr>
-          <p:cNvSpPr txBox="1"/>
-          <p:nvPr/>
-        </p:nvSpPr>
-        <p:spPr>
-          <a:xfrm>
-            <a:off x="736708" y="2036066"/>
-            <a:ext cx="1297535" cy="307777"/>
-          </a:xfrm>
-          <a:prstGeom prst="rect">
-            <a:avLst/>
-          </a:prstGeom>
-          <a:noFill/>
-        </p:spPr>
-        <p:txBody>
-          <a:bodyPr wrap="none" rtlCol="0">
-            <a:spAutoFit/>
-          </a:bodyPr>
-          <a:lstStyle/>
-          <a:p>
-            <a:r>
-              <a:rPr lang="en-US" sz="1400" i="1" dirty="0">
-                <a:solidFill>
-                  <a:schemeClr val="tx1">
-                    <a:lumMod val="50000"/>
-                    <a:lumOff val="50000"/>
-                  </a:schemeClr>
-                </a:solidFill>
-              </a:rPr>
-              <a:t>Clase “</a:t>
-            </a:r>
-            <a:r>
-              <a:rPr lang="en-US" sz="1400" i="1" dirty="0" err="1">
-                <a:solidFill>
-                  <a:schemeClr val="tx1">
-                    <a:lumMod val="50000"/>
-                    <a:lumOff val="50000"/>
-                  </a:schemeClr>
-                </a:solidFill>
-              </a:rPr>
-              <a:t>Servicio</a:t>
-            </a:r>
-            <a:r>
-              <a:rPr lang="en-US" sz="1400" i="1" dirty="0">
-                <a:solidFill>
-                  <a:schemeClr val="tx1">
-                    <a:lumMod val="50000"/>
-                    <a:lumOff val="50000"/>
-                  </a:schemeClr>
-                </a:solidFill>
-              </a:rPr>
-              <a:t>”</a:t>
-            </a:r>
-          </a:p>
-        </p:txBody>
-      </p:sp>
-      <p:sp>
-        <p:nvSpPr>
-          <p:cNvPr id="12" name="CuadroTexto 11">
-            <a:extLst>
-              <a:ext uri="{FF2B5EF4-FFF2-40B4-BE49-F238E27FC236}">
-                <a16:creationId xmlns:a16="http://schemas.microsoft.com/office/drawing/2014/main" id="{E468F284-DAEC-FD14-6507-3B5951CE982C}"/>
-              </a:ext>
-            </a:extLst>
-          </p:cNvPr>
-          <p:cNvSpPr txBox="1"/>
-          <p:nvPr/>
-        </p:nvSpPr>
-        <p:spPr>
-          <a:xfrm>
-            <a:off x="5447232" y="2120877"/>
-            <a:ext cx="1412438" cy="307777"/>
-          </a:xfrm>
-          <a:prstGeom prst="rect">
-            <a:avLst/>
-          </a:prstGeom>
-          <a:noFill/>
-        </p:spPr>
-        <p:txBody>
-          <a:bodyPr wrap="none" rtlCol="0">
-            <a:spAutoFit/>
-          </a:bodyPr>
-          <a:lstStyle/>
-          <a:p>
-            <a:r>
-              <a:rPr lang="en-US" sz="1400" i="1" dirty="0" err="1">
-                <a:solidFill>
-                  <a:schemeClr val="tx1">
-                    <a:lumMod val="50000"/>
-                    <a:lumOff val="50000"/>
-                  </a:schemeClr>
-                </a:solidFill>
-              </a:rPr>
-              <a:t>Controlador</a:t>
-            </a:r>
-            <a:r>
-              <a:rPr lang="en-US" sz="1400" i="1" dirty="0">
-                <a:solidFill>
-                  <a:schemeClr val="tx1">
-                    <a:lumMod val="50000"/>
-                    <a:lumOff val="50000"/>
-                  </a:schemeClr>
-                </a:solidFill>
-              </a:rPr>
-              <a:t> REST</a:t>
-            </a:r>
-          </a:p>
-        </p:txBody>
-      </p:sp>
-    </p:spTree>
-    <p:extLst>
-      <p:ext uri="{BB962C8B-B14F-4D97-AF65-F5344CB8AC3E}">
-        <p14:creationId xmlns:p14="http://schemas.microsoft.com/office/powerpoint/2010/main" val="3472548285"/>
-      </p:ext>
-    </p:extLst>
-  </p:cSld>
-  <p:clrMapOvr>
-    <a:masterClrMapping/>
-  </p:clrMapOvr>
-</p:sld>
-</file>
-
-<file path=ppt/slides/slide11.xml><?xml version="1.0" encoding="utf-8"?>
-<p:sld xmlns:a="http://schemas.openxmlformats.org/drawingml/2006/main" xmlns:r="http://schemas.openxmlformats.org/officeDocument/2006/relationships" xmlns:p="http://schemas.openxmlformats.org/presentationml/2006/main">
-  <p:cSld>
-    <p:spTree>
-      <p:nvGrpSpPr>
-        <p:cNvPr id="1" name=""/>
-        <p:cNvGrpSpPr/>
-        <p:nvPr/>
-      </p:nvGrpSpPr>
-      <p:grpSpPr>
-        <a:xfrm>
-          <a:off x="0" y="0"/>
-          <a:ext cx="0" cy="0"/>
-          <a:chOff x="0" y="0"/>
-          <a:chExt cx="0" cy="0"/>
-        </a:xfrm>
-      </p:grpSpPr>
-      <p:sp>
-        <p:nvSpPr>
-          <p:cNvPr id="2" name="Título 1">
-            <a:extLst>
-              <a:ext uri="{FF2B5EF4-FFF2-40B4-BE49-F238E27FC236}">
-                <a16:creationId xmlns:a16="http://schemas.microsoft.com/office/drawing/2014/main" id="{D805C129-ACCC-9230-355D-5CFBABCC4D39}"/>
-              </a:ext>
-            </a:extLst>
-          </p:cNvPr>
-          <p:cNvSpPr>
-            <a:spLocks noGrp="1"/>
-          </p:cNvSpPr>
-          <p:nvPr>
-            <p:ph type="title"/>
-          </p:nvPr>
-        </p:nvSpPr>
-        <p:spPr/>
-        <p:txBody>
-          <a:bodyPr/>
-          <a:lstStyle/>
-          <a:p>
-            <a:r>
-              <a:rPr lang="en-US" dirty="0"/>
-              <a:t>Postman</a:t>
-            </a:r>
-          </a:p>
-        </p:txBody>
-      </p:sp>
-      <p:sp>
-        <p:nvSpPr>
-          <p:cNvPr id="3" name="Marcador de contenido 2">
-            <a:extLst>
-              <a:ext uri="{FF2B5EF4-FFF2-40B4-BE49-F238E27FC236}">
-                <a16:creationId xmlns:a16="http://schemas.microsoft.com/office/drawing/2014/main" id="{9D050B58-2869-7689-C473-3663EEE0EAB8}"/>
-              </a:ext>
-            </a:extLst>
-          </p:cNvPr>
-          <p:cNvSpPr>
-            <a:spLocks noGrp="1"/>
-          </p:cNvSpPr>
-          <p:nvPr>
-            <p:ph idx="1"/>
-          </p:nvPr>
-        </p:nvSpPr>
-        <p:spPr>
-          <a:xfrm>
-            <a:off x="1024127" y="2249424"/>
-            <a:ext cx="9720073" cy="4023360"/>
-          </a:xfrm>
-        </p:spPr>
-        <p:txBody>
-          <a:bodyPr/>
-          <a:lstStyle/>
-          <a:p>
-            <a:r>
-              <a:rPr lang="en-US" dirty="0" err="1"/>
-              <a:t>Pruebas</a:t>
-            </a:r>
-            <a:r>
-              <a:rPr lang="en-US" dirty="0"/>
-              <a:t> de </a:t>
-            </a:r>
-            <a:r>
-              <a:rPr lang="en-US" dirty="0" err="1"/>
-              <a:t>peticiones</a:t>
-            </a:r>
-            <a:r>
-              <a:rPr lang="en-US" dirty="0"/>
-              <a:t> REST</a:t>
-            </a:r>
-          </a:p>
-        </p:txBody>
-      </p:sp>
-      <p:pic>
-        <p:nvPicPr>
-          <p:cNvPr id="4" name="Imagen 3" descr="Logotipo&#10;&#10;El contenido generado por IA puede ser incorrecto.">
-            <a:extLst>
-              <a:ext uri="{FF2B5EF4-FFF2-40B4-BE49-F238E27FC236}">
-                <a16:creationId xmlns:a16="http://schemas.microsoft.com/office/drawing/2014/main" id="{049DEBFD-4ED3-1978-4BFE-E3AD81581736}"/>
-              </a:ext>
-            </a:extLst>
-          </p:cNvPr>
-          <p:cNvPicPr>
-            <a:picLocks noChangeAspect="1"/>
-          </p:cNvPicPr>
-          <p:nvPr/>
-        </p:nvPicPr>
-        <p:blipFill>
-          <a:blip r:embed="rId2"/>
-          <a:stretch>
-            <a:fillRect/>
-          </a:stretch>
-        </p:blipFill>
-        <p:spPr>
-          <a:xfrm>
-            <a:off x="1621834" y="3529490"/>
-            <a:ext cx="2767285" cy="2487357"/>
-          </a:xfrm>
-          <a:prstGeom prst="rect">
-            <a:avLst/>
-          </a:prstGeom>
-        </p:spPr>
-      </p:pic>
-      <p:sp>
-        <p:nvSpPr>
-          <p:cNvPr id="5" name="CuadroTexto 4">
-            <a:extLst>
-              <a:ext uri="{FF2B5EF4-FFF2-40B4-BE49-F238E27FC236}">
-                <a16:creationId xmlns:a16="http://schemas.microsoft.com/office/drawing/2014/main" id="{CC8E04FE-7C13-2EA0-5523-757884A4B699}"/>
-              </a:ext>
-            </a:extLst>
-          </p:cNvPr>
-          <p:cNvSpPr txBox="1"/>
-          <p:nvPr/>
-        </p:nvSpPr>
-        <p:spPr>
-          <a:xfrm>
-            <a:off x="6096000" y="2672828"/>
-            <a:ext cx="1798890" cy="307777"/>
-          </a:xfrm>
-          <a:prstGeom prst="rect">
-            <a:avLst/>
-          </a:prstGeom>
-          <a:noFill/>
-        </p:spPr>
-        <p:txBody>
-          <a:bodyPr wrap="none" rtlCol="0">
-            <a:spAutoFit/>
-          </a:bodyPr>
-          <a:lstStyle/>
-          <a:p>
-            <a:r>
-              <a:rPr lang="en-US" sz="1400" i="1" dirty="0" err="1">
-                <a:solidFill>
-                  <a:schemeClr val="tx1">
-                    <a:lumMod val="50000"/>
-                    <a:lumOff val="50000"/>
-                  </a:schemeClr>
-                </a:solidFill>
-              </a:rPr>
-              <a:t>Prueba</a:t>
-            </a:r>
-            <a:r>
-              <a:rPr lang="en-US" sz="1400" i="1" dirty="0">
-                <a:solidFill>
-                  <a:schemeClr val="tx1">
-                    <a:lumMod val="50000"/>
-                    <a:lumOff val="50000"/>
-                  </a:schemeClr>
-                </a:solidFill>
-              </a:rPr>
-              <a:t> de </a:t>
-            </a:r>
-            <a:r>
-              <a:rPr lang="en-US" sz="1400" i="1" dirty="0" err="1">
-                <a:solidFill>
-                  <a:schemeClr val="tx1">
-                    <a:lumMod val="50000"/>
-                    <a:lumOff val="50000"/>
-                  </a:schemeClr>
-                </a:solidFill>
-              </a:rPr>
-              <a:t>petición</a:t>
-            </a:r>
-            <a:r>
-              <a:rPr lang="en-US" sz="1400" i="1" dirty="0">
-                <a:solidFill>
-                  <a:schemeClr val="tx1">
-                    <a:lumMod val="50000"/>
-                    <a:lumOff val="50000"/>
-                  </a:schemeClr>
-                </a:solidFill>
-              </a:rPr>
-              <a:t> GET</a:t>
-            </a:r>
-          </a:p>
-        </p:txBody>
-      </p:sp>
-      <p:pic>
-        <p:nvPicPr>
-          <p:cNvPr id="1029" name="Picture 5">
-            <a:extLst>
-              <a:ext uri="{FF2B5EF4-FFF2-40B4-BE49-F238E27FC236}">
-                <a16:creationId xmlns:a16="http://schemas.microsoft.com/office/drawing/2014/main" id="{84EEB936-51B0-7454-01D8-E7F5C221B343}"/>
-              </a:ext>
-            </a:extLst>
-          </p:cNvPr>
-          <p:cNvPicPr>
-            <a:picLocks noChangeAspect="1" noChangeArrowheads="1"/>
-          </p:cNvPicPr>
-          <p:nvPr/>
-        </p:nvPicPr>
-        <p:blipFill>
-          <a:blip r:embed="rId3">
-            <a:extLst>
-              <a:ext uri="{28A0092B-C50C-407E-A947-70E740481C1C}">
-                <a14:useLocalDpi xmlns:a14="http://schemas.microsoft.com/office/drawing/2010/main" val="0"/>
-              </a:ext>
-            </a:extLst>
-          </a:blip>
-          <a:srcRect/>
-          <a:stretch>
-            <a:fillRect/>
-          </a:stretch>
-        </p:blipFill>
-        <p:spPr bwMode="auto">
-          <a:xfrm>
-            <a:off x="6096000" y="3047555"/>
-            <a:ext cx="5608637" cy="3451225"/>
-          </a:xfrm>
-          <a:prstGeom prst="rect">
-            <a:avLst/>
-          </a:prstGeom>
-          <a:noFill/>
-          <a:ln>
-            <a:noFill/>
-          </a:ln>
-          <a:extLst>
-            <a:ext uri="{909E8E84-426E-40DD-AFC4-6F175D3DCCD1}">
-              <a14:hiddenFill xmlns:a14="http://schemas.microsoft.com/office/drawing/2010/main">
-                <a:solidFill>
-                  <a:srgbClr val="FFFFFF"/>
-                </a:solidFill>
-              </a14:hiddenFill>
-            </a:ext>
-            <a:ext uri="{91240B29-F687-4F45-9708-019B960494DF}">
-              <a14:hiddenLine xmlns:a14="http://schemas.microsoft.com/office/drawing/2010/main" w="9525">
-                <a:solidFill>
-                  <a:srgbClr val="000000"/>
-                </a:solidFill>
-                <a:miter lim="800000"/>
-                <a:headEnd/>
-                <a:tailEnd/>
-              </a14:hiddenLine>
-            </a:ext>
-          </a:extLst>
-        </p:spPr>
-      </p:pic>
-    </p:spTree>
-    <p:extLst>
-      <p:ext uri="{BB962C8B-B14F-4D97-AF65-F5344CB8AC3E}">
-        <p14:creationId xmlns:p14="http://schemas.microsoft.com/office/powerpoint/2010/main" val="3390865254"/>
-      </p:ext>
-    </p:extLst>
-  </p:cSld>
-  <p:clrMapOvr>
-    <a:masterClrMapping/>
-  </p:clrMapOvr>
-</p:sld>
-</file>
-
-<file path=ppt/slides/slide12.xml><?xml version="1.0" encoding="utf-8"?>
-<p:sld xmlns:a="http://schemas.openxmlformats.org/drawingml/2006/main" xmlns:r="http://schemas.openxmlformats.org/officeDocument/2006/relationships" xmlns:p="http://schemas.openxmlformats.org/presentationml/2006/main">
-  <p:cSld>
-    <p:spTree>
-      <p:nvGrpSpPr>
-        <p:cNvPr id="1" name=""/>
-        <p:cNvGrpSpPr/>
-        <p:nvPr/>
-      </p:nvGrpSpPr>
-      <p:grpSpPr>
-        <a:xfrm>
-          <a:off x="0" y="0"/>
-          <a:ext cx="0" cy="0"/>
-          <a:chOff x="0" y="0"/>
-          <a:chExt cx="0" cy="0"/>
-        </a:xfrm>
-      </p:grpSpPr>
-      <p:sp>
-        <p:nvSpPr>
-          <p:cNvPr id="2" name="Título 1">
-            <a:extLst>
-              <a:ext uri="{FF2B5EF4-FFF2-40B4-BE49-F238E27FC236}">
-                <a16:creationId xmlns:a16="http://schemas.microsoft.com/office/drawing/2014/main" id="{30908387-7445-A852-F050-D14D8D2E2F3D}"/>
-              </a:ext>
-            </a:extLst>
-          </p:cNvPr>
-          <p:cNvSpPr>
-            <a:spLocks noGrp="1"/>
-          </p:cNvSpPr>
-          <p:nvPr>
-            <p:ph type="title"/>
-          </p:nvPr>
-        </p:nvSpPr>
-        <p:spPr/>
-        <p:txBody>
-          <a:bodyPr/>
-          <a:lstStyle/>
-          <a:p>
-            <a:r>
-              <a:rPr lang="en-US" dirty="0" err="1"/>
-              <a:t>Pruebas</a:t>
-            </a:r>
-            <a:r>
-              <a:rPr lang="en-US" dirty="0"/>
-              <a:t> de </a:t>
-            </a:r>
-            <a:r>
-              <a:rPr lang="en-US" dirty="0" err="1"/>
-              <a:t>Peticiones</a:t>
-            </a:r>
-            <a:r>
-              <a:rPr lang="en-US" dirty="0"/>
-              <a:t> REST</a:t>
-            </a:r>
-          </a:p>
-        </p:txBody>
-      </p:sp>
-      <p:pic>
-        <p:nvPicPr>
-          <p:cNvPr id="2051" name="Picture 3">
-            <a:extLst>
-              <a:ext uri="{FF2B5EF4-FFF2-40B4-BE49-F238E27FC236}">
-                <a16:creationId xmlns:a16="http://schemas.microsoft.com/office/drawing/2014/main" id="{004C6DC1-3C7F-BBC1-5106-063A2F0B83CE}"/>
-              </a:ext>
-            </a:extLst>
-          </p:cNvPr>
-          <p:cNvPicPr>
-            <a:picLocks noChangeAspect="1" noChangeArrowheads="1"/>
-          </p:cNvPicPr>
-          <p:nvPr/>
-        </p:nvPicPr>
-        <p:blipFill>
-          <a:blip r:embed="rId2">
-            <a:extLst>
-              <a:ext uri="{28A0092B-C50C-407E-A947-70E740481C1C}">
-                <a14:useLocalDpi xmlns:a14="http://schemas.microsoft.com/office/drawing/2010/main" val="0"/>
-              </a:ext>
-            </a:extLst>
-          </a:blip>
-          <a:srcRect/>
-          <a:stretch>
-            <a:fillRect/>
-          </a:stretch>
-        </p:blipFill>
-        <p:spPr bwMode="auto">
-          <a:xfrm>
-            <a:off x="275527" y="2672825"/>
-            <a:ext cx="5608637" cy="2546350"/>
-          </a:xfrm>
-          <a:prstGeom prst="rect">
-            <a:avLst/>
-          </a:prstGeom>
-          <a:noFill/>
-          <a:ln>
-            <a:noFill/>
-          </a:ln>
-          <a:extLst>
-            <a:ext uri="{909E8E84-426E-40DD-AFC4-6F175D3DCCD1}">
-              <a14:hiddenFill xmlns:a14="http://schemas.microsoft.com/office/drawing/2010/main">
-                <a:solidFill>
-                  <a:srgbClr val="FFFFFF"/>
-                </a:solidFill>
-              </a14:hiddenFill>
-            </a:ext>
-            <a:ext uri="{91240B29-F687-4F45-9708-019B960494DF}">
-              <a14:hiddenLine xmlns:a14="http://schemas.microsoft.com/office/drawing/2010/main" w="9525">
-                <a:solidFill>
-                  <a:srgbClr val="000000"/>
-                </a:solidFill>
-                <a:miter lim="800000"/>
-                <a:headEnd/>
-                <a:tailEnd/>
-              </a14:hiddenLine>
-            </a:ext>
-          </a:extLst>
-        </p:spPr>
-      </p:pic>
-      <p:sp>
-        <p:nvSpPr>
-          <p:cNvPr id="4" name="CuadroTexto 3">
-            <a:extLst>
-              <a:ext uri="{FF2B5EF4-FFF2-40B4-BE49-F238E27FC236}">
-                <a16:creationId xmlns:a16="http://schemas.microsoft.com/office/drawing/2014/main" id="{1621D1FA-235D-6188-6D81-F3F9EB764A71}"/>
-              </a:ext>
-            </a:extLst>
-          </p:cNvPr>
-          <p:cNvSpPr txBox="1"/>
-          <p:nvPr/>
-        </p:nvSpPr>
-        <p:spPr>
-          <a:xfrm>
-            <a:off x="6307836" y="2295960"/>
-            <a:ext cx="1917513" cy="307777"/>
-          </a:xfrm>
-          <a:prstGeom prst="rect">
-            <a:avLst/>
-          </a:prstGeom>
-          <a:noFill/>
-        </p:spPr>
-        <p:txBody>
-          <a:bodyPr wrap="none" rtlCol="0">
-            <a:spAutoFit/>
-          </a:bodyPr>
-          <a:lstStyle/>
-          <a:p>
-            <a:r>
-              <a:rPr lang="en-US" sz="1400" i="1" dirty="0" err="1">
-                <a:solidFill>
-                  <a:schemeClr val="tx1">
-                    <a:lumMod val="50000"/>
-                    <a:lumOff val="50000"/>
-                  </a:schemeClr>
-                </a:solidFill>
-              </a:rPr>
-              <a:t>Prueba</a:t>
-            </a:r>
-            <a:r>
-              <a:rPr lang="en-US" sz="1400" i="1" dirty="0">
-                <a:solidFill>
-                  <a:schemeClr val="tx1">
-                    <a:lumMod val="50000"/>
-                    <a:lumOff val="50000"/>
-                  </a:schemeClr>
-                </a:solidFill>
-              </a:rPr>
-              <a:t> de </a:t>
-            </a:r>
-            <a:r>
-              <a:rPr lang="en-US" sz="1400" i="1" dirty="0" err="1">
-                <a:solidFill>
-                  <a:schemeClr val="tx1">
-                    <a:lumMod val="50000"/>
-                    <a:lumOff val="50000"/>
-                  </a:schemeClr>
-                </a:solidFill>
-              </a:rPr>
-              <a:t>petición</a:t>
-            </a:r>
-            <a:r>
-              <a:rPr lang="en-US" sz="1400" i="1" dirty="0">
-                <a:solidFill>
-                  <a:schemeClr val="tx1">
-                    <a:lumMod val="50000"/>
-                    <a:lumOff val="50000"/>
-                  </a:schemeClr>
-                </a:solidFill>
-              </a:rPr>
-              <a:t> POST</a:t>
-            </a:r>
-          </a:p>
-        </p:txBody>
-      </p:sp>
-      <p:sp>
-        <p:nvSpPr>
-          <p:cNvPr id="5" name="CuadroTexto 4">
-            <a:extLst>
-              <a:ext uri="{FF2B5EF4-FFF2-40B4-BE49-F238E27FC236}">
-                <a16:creationId xmlns:a16="http://schemas.microsoft.com/office/drawing/2014/main" id="{9EF01C1B-8EDD-F24E-1914-C8A492ECBC5B}"/>
-              </a:ext>
-            </a:extLst>
-          </p:cNvPr>
-          <p:cNvSpPr txBox="1"/>
-          <p:nvPr/>
-        </p:nvSpPr>
-        <p:spPr>
-          <a:xfrm>
-            <a:off x="258982" y="2295960"/>
-            <a:ext cx="1530291" cy="307777"/>
-          </a:xfrm>
-          <a:prstGeom prst="rect">
-            <a:avLst/>
-          </a:prstGeom>
-          <a:noFill/>
-        </p:spPr>
-        <p:txBody>
-          <a:bodyPr wrap="none" rtlCol="0">
-            <a:spAutoFit/>
-          </a:bodyPr>
-          <a:lstStyle/>
-          <a:p>
-            <a:r>
-              <a:rPr lang="en-US" sz="1400" i="1" dirty="0" err="1">
-                <a:solidFill>
-                  <a:schemeClr val="tx1">
-                    <a:lumMod val="50000"/>
-                    <a:lumOff val="50000"/>
-                  </a:schemeClr>
-                </a:solidFill>
-              </a:rPr>
-              <a:t>Petición</a:t>
-            </a:r>
-            <a:r>
-              <a:rPr lang="en-US" sz="1400" i="1" dirty="0">
-                <a:solidFill>
-                  <a:schemeClr val="tx1">
-                    <a:lumMod val="50000"/>
-                    <a:lumOff val="50000"/>
-                  </a:schemeClr>
-                </a:solidFill>
-              </a:rPr>
-              <a:t> GET con ID</a:t>
-            </a:r>
-          </a:p>
-        </p:txBody>
-      </p:sp>
-      <p:pic>
-        <p:nvPicPr>
-          <p:cNvPr id="2052" name="Picture 4">
-            <a:extLst>
-              <a:ext uri="{FF2B5EF4-FFF2-40B4-BE49-F238E27FC236}">
-                <a16:creationId xmlns:a16="http://schemas.microsoft.com/office/drawing/2014/main" id="{0B5ECA8B-FFF0-A662-DBE9-5F72E04A6EDD}"/>
-              </a:ext>
-            </a:extLst>
-          </p:cNvPr>
-          <p:cNvPicPr>
-            <a:picLocks noChangeAspect="1" noChangeArrowheads="1"/>
-          </p:cNvPicPr>
-          <p:nvPr/>
-        </p:nvPicPr>
-        <p:blipFill>
-          <a:blip r:embed="rId3">
-            <a:extLst>
-              <a:ext uri="{28A0092B-C50C-407E-A947-70E740481C1C}">
-                <a14:useLocalDpi xmlns:a14="http://schemas.microsoft.com/office/drawing/2010/main" val="0"/>
-              </a:ext>
-            </a:extLst>
-          </a:blip>
-          <a:srcRect/>
-          <a:stretch>
-            <a:fillRect/>
-          </a:stretch>
-        </p:blipFill>
-        <p:spPr bwMode="auto">
-          <a:xfrm>
-            <a:off x="6307836" y="2672825"/>
-            <a:ext cx="5608637" cy="3078163"/>
-          </a:xfrm>
-          <a:prstGeom prst="rect">
-            <a:avLst/>
-          </a:prstGeom>
-          <a:noFill/>
-          <a:ln>
-            <a:noFill/>
-          </a:ln>
-          <a:extLst>
-            <a:ext uri="{909E8E84-426E-40DD-AFC4-6F175D3DCCD1}">
-              <a14:hiddenFill xmlns:a14="http://schemas.microsoft.com/office/drawing/2010/main">
-                <a:solidFill>
-                  <a:srgbClr val="FFFFFF"/>
-                </a:solidFill>
-              </a14:hiddenFill>
-            </a:ext>
-            <a:ext uri="{91240B29-F687-4F45-9708-019B960494DF}">
-              <a14:hiddenLine xmlns:a14="http://schemas.microsoft.com/office/drawing/2010/main" w="9525">
-                <a:solidFill>
-                  <a:srgbClr val="000000"/>
-                </a:solidFill>
-                <a:miter lim="800000"/>
-                <a:headEnd/>
-                <a:tailEnd/>
-              </a14:hiddenLine>
-            </a:ext>
-          </a:extLst>
-        </p:spPr>
-      </p:pic>
-    </p:spTree>
-    <p:extLst>
-      <p:ext uri="{BB962C8B-B14F-4D97-AF65-F5344CB8AC3E}">
-        <p14:creationId xmlns:p14="http://schemas.microsoft.com/office/powerpoint/2010/main" val="1421363877"/>
-      </p:ext>
-    </p:extLst>
-  </p:cSld>
-  <p:clrMapOvr>
-    <a:masterClrMapping/>
-  </p:clrMapOvr>
-</p:sld>
-</file>
-
-<file path=ppt/slides/slide13.xml><?xml version="1.0" encoding="utf-8"?>
-<p:sld xmlns:a="http://schemas.openxmlformats.org/drawingml/2006/main" xmlns:r="http://schemas.openxmlformats.org/officeDocument/2006/relationships" xmlns:p="http://schemas.openxmlformats.org/presentationml/2006/main">
-  <p:cSld>
-    <p:spTree>
-      <p:nvGrpSpPr>
-        <p:cNvPr id="1" name="">
-          <a:extLst>
-            <a:ext uri="{FF2B5EF4-FFF2-40B4-BE49-F238E27FC236}">
-              <a16:creationId xmlns:a16="http://schemas.microsoft.com/office/drawing/2014/main" id="{6E89347E-83EB-E002-F814-E189BD912FCB}"/>
-            </a:ext>
-          </a:extLst>
-        </p:cNvPr>
-        <p:cNvGrpSpPr/>
-        <p:nvPr/>
-      </p:nvGrpSpPr>
-      <p:grpSpPr>
-        <a:xfrm>
-          <a:off x="0" y="0"/>
-          <a:ext cx="0" cy="0"/>
-          <a:chOff x="0" y="0"/>
-          <a:chExt cx="0" cy="0"/>
-        </a:xfrm>
-      </p:grpSpPr>
-      <p:sp>
-        <p:nvSpPr>
-          <p:cNvPr id="2" name="Título 1">
-            <a:extLst>
-              <a:ext uri="{FF2B5EF4-FFF2-40B4-BE49-F238E27FC236}">
-                <a16:creationId xmlns:a16="http://schemas.microsoft.com/office/drawing/2014/main" id="{C99C52F3-E23C-AFB7-7160-3C5CEB74036C}"/>
-              </a:ext>
-            </a:extLst>
-          </p:cNvPr>
-          <p:cNvSpPr>
-            <a:spLocks noGrp="1"/>
-          </p:cNvSpPr>
-          <p:nvPr>
-            <p:ph type="title"/>
-          </p:nvPr>
-        </p:nvSpPr>
-        <p:spPr/>
-        <p:txBody>
-          <a:bodyPr/>
-          <a:lstStyle/>
-          <a:p>
-            <a:r>
-              <a:rPr lang="en-US" dirty="0" err="1"/>
-              <a:t>Pruebas</a:t>
-            </a:r>
-            <a:r>
-              <a:rPr lang="en-US" dirty="0"/>
-              <a:t> de </a:t>
-            </a:r>
-            <a:r>
-              <a:rPr lang="en-US" dirty="0" err="1"/>
-              <a:t>Peticiones</a:t>
-            </a:r>
-            <a:r>
-              <a:rPr lang="en-US" dirty="0"/>
-              <a:t> REST</a:t>
-            </a:r>
-          </a:p>
-        </p:txBody>
-      </p:sp>
-      <p:sp>
-        <p:nvSpPr>
-          <p:cNvPr id="4" name="CuadroTexto 3">
-            <a:extLst>
-              <a:ext uri="{FF2B5EF4-FFF2-40B4-BE49-F238E27FC236}">
-                <a16:creationId xmlns:a16="http://schemas.microsoft.com/office/drawing/2014/main" id="{E62D2F00-05FA-CB9E-80AD-011035B67831}"/>
-              </a:ext>
-            </a:extLst>
-          </p:cNvPr>
-          <p:cNvSpPr txBox="1"/>
-          <p:nvPr/>
-        </p:nvSpPr>
-        <p:spPr>
-          <a:xfrm>
-            <a:off x="6307836" y="2405487"/>
-            <a:ext cx="1745093" cy="307777"/>
-          </a:xfrm>
-          <a:prstGeom prst="rect">
-            <a:avLst/>
-          </a:prstGeom>
-          <a:noFill/>
-        </p:spPr>
-        <p:txBody>
-          <a:bodyPr wrap="none" rtlCol="0">
-            <a:spAutoFit/>
-          </a:bodyPr>
-          <a:lstStyle/>
-          <a:p>
-            <a:r>
-              <a:rPr lang="en-US" sz="1400" i="1" dirty="0" err="1">
-                <a:solidFill>
-                  <a:schemeClr val="tx1">
-                    <a:lumMod val="50000"/>
-                    <a:lumOff val="50000"/>
-                  </a:schemeClr>
-                </a:solidFill>
-              </a:rPr>
-              <a:t>Petición</a:t>
-            </a:r>
-            <a:r>
-              <a:rPr lang="en-US" sz="1400" i="1" dirty="0">
-                <a:solidFill>
-                  <a:schemeClr val="tx1">
-                    <a:lumMod val="50000"/>
-                    <a:lumOff val="50000"/>
-                  </a:schemeClr>
-                </a:solidFill>
-              </a:rPr>
-              <a:t> DELETE con ID</a:t>
-            </a:r>
-          </a:p>
-        </p:txBody>
-      </p:sp>
-      <p:sp>
-        <p:nvSpPr>
-          <p:cNvPr id="5" name="CuadroTexto 4">
-            <a:extLst>
-              <a:ext uri="{FF2B5EF4-FFF2-40B4-BE49-F238E27FC236}">
-                <a16:creationId xmlns:a16="http://schemas.microsoft.com/office/drawing/2014/main" id="{63B65B1D-FD26-006A-FA55-1DA6E3EBBDE7}"/>
-              </a:ext>
-            </a:extLst>
-          </p:cNvPr>
-          <p:cNvSpPr txBox="1"/>
-          <p:nvPr/>
-        </p:nvSpPr>
-        <p:spPr>
-          <a:xfrm>
-            <a:off x="258982" y="2405488"/>
-            <a:ext cx="1530291" cy="307777"/>
-          </a:xfrm>
-          <a:prstGeom prst="rect">
-            <a:avLst/>
-          </a:prstGeom>
-          <a:noFill/>
-        </p:spPr>
-        <p:txBody>
-          <a:bodyPr wrap="none" rtlCol="0">
-            <a:spAutoFit/>
-          </a:bodyPr>
-          <a:lstStyle/>
-          <a:p>
-            <a:r>
-              <a:rPr lang="en-US" sz="1400" i="1" dirty="0" err="1">
-                <a:solidFill>
-                  <a:schemeClr val="tx1">
-                    <a:lumMod val="50000"/>
-                    <a:lumOff val="50000"/>
-                  </a:schemeClr>
-                </a:solidFill>
-              </a:rPr>
-              <a:t>Petición</a:t>
-            </a:r>
-            <a:r>
-              <a:rPr lang="en-US" sz="1400" i="1" dirty="0">
-                <a:solidFill>
-                  <a:schemeClr val="tx1">
-                    <a:lumMod val="50000"/>
-                    <a:lumOff val="50000"/>
-                  </a:schemeClr>
-                </a:solidFill>
-              </a:rPr>
-              <a:t> PUT con ID</a:t>
-            </a:r>
-          </a:p>
-        </p:txBody>
-      </p:sp>
-      <p:pic>
-        <p:nvPicPr>
-          <p:cNvPr id="3074" name="Picture 2">
-            <a:extLst>
-              <a:ext uri="{FF2B5EF4-FFF2-40B4-BE49-F238E27FC236}">
-                <a16:creationId xmlns:a16="http://schemas.microsoft.com/office/drawing/2014/main" id="{6000E0B5-1752-D744-8B6E-EF6AEAE72424}"/>
-              </a:ext>
-            </a:extLst>
-          </p:cNvPr>
-          <p:cNvPicPr>
-            <a:picLocks noChangeAspect="1" noChangeArrowheads="1"/>
-          </p:cNvPicPr>
-          <p:nvPr/>
-        </p:nvPicPr>
-        <p:blipFill>
-          <a:blip r:embed="rId2">
-            <a:extLst>
-              <a:ext uri="{28A0092B-C50C-407E-A947-70E740481C1C}">
-                <a14:useLocalDpi xmlns:a14="http://schemas.microsoft.com/office/drawing/2010/main" val="0"/>
-              </a:ext>
-            </a:extLst>
-          </a:blip>
-          <a:srcRect/>
-          <a:stretch>
-            <a:fillRect/>
-          </a:stretch>
-        </p:blipFill>
-        <p:spPr bwMode="auto">
-          <a:xfrm>
-            <a:off x="275527" y="2713265"/>
-            <a:ext cx="5608637" cy="3276600"/>
-          </a:xfrm>
-          <a:prstGeom prst="rect">
-            <a:avLst/>
-          </a:prstGeom>
-          <a:noFill/>
-          <a:ln>
-            <a:noFill/>
-          </a:ln>
-          <a:extLst>
-            <a:ext uri="{909E8E84-426E-40DD-AFC4-6F175D3DCCD1}">
-              <a14:hiddenFill xmlns:a14="http://schemas.microsoft.com/office/drawing/2010/main">
-                <a:solidFill>
-                  <a:srgbClr val="FFFFFF"/>
-                </a:solidFill>
-              </a14:hiddenFill>
-            </a:ext>
-            <a:ext uri="{91240B29-F687-4F45-9708-019B960494DF}">
-              <a14:hiddenLine xmlns:a14="http://schemas.microsoft.com/office/drawing/2010/main" w="9525">
-                <a:solidFill>
-                  <a:srgbClr val="000000"/>
-                </a:solidFill>
-                <a:miter lim="800000"/>
-                <a:headEnd/>
-                <a:tailEnd/>
-              </a14:hiddenLine>
-            </a:ext>
-          </a:extLst>
-        </p:spPr>
-      </p:pic>
-      <p:pic>
-        <p:nvPicPr>
-          <p:cNvPr id="3075" name="Picture 3">
-            <a:extLst>
-              <a:ext uri="{FF2B5EF4-FFF2-40B4-BE49-F238E27FC236}">
-                <a16:creationId xmlns:a16="http://schemas.microsoft.com/office/drawing/2014/main" id="{E93C8176-61A9-E34A-8701-6A520C522F2D}"/>
-              </a:ext>
-            </a:extLst>
-          </p:cNvPr>
-          <p:cNvPicPr>
-            <a:picLocks noChangeAspect="1" noChangeArrowheads="1"/>
-          </p:cNvPicPr>
-          <p:nvPr/>
-        </p:nvPicPr>
-        <p:blipFill>
-          <a:blip r:embed="rId3">
-            <a:extLst>
-              <a:ext uri="{28A0092B-C50C-407E-A947-70E740481C1C}">
-                <a14:useLocalDpi xmlns:a14="http://schemas.microsoft.com/office/drawing/2010/main" val="0"/>
-              </a:ext>
-            </a:extLst>
-          </a:blip>
-          <a:srcRect/>
-          <a:stretch>
-            <a:fillRect/>
-          </a:stretch>
-        </p:blipFill>
-        <p:spPr bwMode="auto">
-          <a:xfrm>
-            <a:off x="6307836" y="2713265"/>
-            <a:ext cx="5608637" cy="2552700"/>
-          </a:xfrm>
-          <a:prstGeom prst="rect">
-            <a:avLst/>
-          </a:prstGeom>
-          <a:noFill/>
-          <a:ln>
-            <a:noFill/>
-          </a:ln>
-          <a:extLst>
-            <a:ext uri="{909E8E84-426E-40DD-AFC4-6F175D3DCCD1}">
-              <a14:hiddenFill xmlns:a14="http://schemas.microsoft.com/office/drawing/2010/main">
-                <a:solidFill>
-                  <a:srgbClr val="FFFFFF"/>
-                </a:solidFill>
-              </a14:hiddenFill>
-            </a:ext>
-            <a:ext uri="{91240B29-F687-4F45-9708-019B960494DF}">
-              <a14:hiddenLine xmlns:a14="http://schemas.microsoft.com/office/drawing/2010/main" w="9525">
-                <a:solidFill>
-                  <a:srgbClr val="000000"/>
-                </a:solidFill>
-                <a:miter lim="800000"/>
-                <a:headEnd/>
-                <a:tailEnd/>
-              </a14:hiddenLine>
-            </a:ext>
-          </a:extLst>
-        </p:spPr>
-      </p:pic>
-    </p:spTree>
-    <p:extLst>
-      <p:ext uri="{BB962C8B-B14F-4D97-AF65-F5344CB8AC3E}">
-        <p14:creationId xmlns:p14="http://schemas.microsoft.com/office/powerpoint/2010/main" val="3486500422"/>
-      </p:ext>
-    </p:extLst>
-  </p:cSld>
-  <p:clrMapOvr>
-    <a:masterClrMapping/>
-  </p:clrMapOvr>
-</p:sld>
-</file>
-
-<file path=ppt/slides/slide14.xml><?xml version="1.0" encoding="utf-8"?>
-<p:sld xmlns:a="http://schemas.openxmlformats.org/drawingml/2006/main" xmlns:r="http://schemas.openxmlformats.org/officeDocument/2006/relationships" xmlns:p="http://schemas.openxmlformats.org/presentationml/2006/main">
-  <p:cSld>
-    <p:spTree>
-      <p:nvGrpSpPr>
-        <p:cNvPr id="1" name=""/>
-        <p:cNvGrpSpPr/>
-        <p:nvPr/>
-      </p:nvGrpSpPr>
-      <p:grpSpPr>
-        <a:xfrm>
-          <a:off x="0" y="0"/>
-          <a:ext cx="0" cy="0"/>
-          <a:chOff x="0" y="0"/>
-          <a:chExt cx="0" cy="0"/>
-        </a:xfrm>
-      </p:grpSpPr>
-      <p:sp>
-        <p:nvSpPr>
-          <p:cNvPr id="2" name="Título 1">
-            <a:extLst>
-              <a:ext uri="{FF2B5EF4-FFF2-40B4-BE49-F238E27FC236}">
-                <a16:creationId xmlns:a16="http://schemas.microsoft.com/office/drawing/2014/main" id="{539A0B2E-8EB7-9A4A-DC7A-3E6B6271F282}"/>
-              </a:ext>
-            </a:extLst>
-          </p:cNvPr>
-          <p:cNvSpPr>
-            <a:spLocks noGrp="1"/>
-          </p:cNvSpPr>
-          <p:nvPr>
-            <p:ph type="title"/>
-          </p:nvPr>
-        </p:nvSpPr>
-        <p:spPr/>
-        <p:txBody>
-          <a:bodyPr/>
-          <a:lstStyle/>
-          <a:p>
-            <a:r>
-              <a:rPr lang="en-US" dirty="0" err="1"/>
-              <a:t>Buenas</a:t>
-            </a:r>
-            <a:r>
-              <a:rPr lang="en-US" dirty="0"/>
-              <a:t> </a:t>
-            </a:r>
-            <a:r>
-              <a:rPr lang="en-US" dirty="0" err="1"/>
-              <a:t>Prácticas</a:t>
-            </a:r>
-            <a:endParaRPr lang="en-US" dirty="0"/>
-          </a:p>
-        </p:txBody>
-      </p:sp>
-      <p:pic>
-        <p:nvPicPr>
-          <p:cNvPr id="5" name="Marcador de contenido 4" descr="Un hombre sentado frente a una computadora&#10;&#10;El contenido generado por IA puede ser incorrecto.">
-            <a:extLst>
-              <a:ext uri="{FF2B5EF4-FFF2-40B4-BE49-F238E27FC236}">
-                <a16:creationId xmlns:a16="http://schemas.microsoft.com/office/drawing/2014/main" id="{96A6D904-E1A2-6589-B7AF-48F1B5ADBF81}"/>
-              </a:ext>
-            </a:extLst>
-          </p:cNvPr>
-          <p:cNvPicPr>
-            <a:picLocks noGrp="1" noChangeAspect="1"/>
-          </p:cNvPicPr>
-          <p:nvPr>
-            <p:ph idx="1"/>
-          </p:nvPr>
-        </p:nvPicPr>
-        <p:blipFill>
-          <a:blip r:embed="rId2"/>
-          <a:stretch>
-            <a:fillRect/>
-          </a:stretch>
-        </p:blipFill>
-        <p:spPr>
-          <a:xfrm>
-            <a:off x="1816418" y="2037556"/>
-            <a:ext cx="8135302" cy="4519612"/>
-          </a:xfrm>
-          <a:effectLst>
-            <a:softEdge rad="127000"/>
-          </a:effectLst>
-        </p:spPr>
-      </p:pic>
-    </p:spTree>
-    <p:extLst>
-      <p:ext uri="{BB962C8B-B14F-4D97-AF65-F5344CB8AC3E}">
-        <p14:creationId xmlns:p14="http://schemas.microsoft.com/office/powerpoint/2010/main" val="3704697609"/>
-      </p:ext>
-    </p:extLst>
-  </p:cSld>
-  <p:clrMapOvr>
-    <a:masterClrMapping/>
-  </p:clrMapOvr>
-</p:sld>
-</file>
-
-<file path=ppt/slides/slide15.xml><?xml version="1.0" encoding="utf-8"?>
+<file path=ppt/slides/slide2.xml><?xml version="1.0" encoding="utf-8"?>
 <p:sld xmlns:a="http://schemas.openxmlformats.org/drawingml/2006/main" xmlns:r="http://schemas.openxmlformats.org/officeDocument/2006/relationships" xmlns:p="http://schemas.openxmlformats.org/presentationml/2006/main">
   <p:cSld>
     <p:spTree>
@@ -21937,134 +20691,6 @@
             <a:spLocks noGrp="1"/>
           </p:cNvSpPr>
           <p:nvPr>
-            <p:ph type="ctrTitle"/>
-          </p:nvPr>
-        </p:nvSpPr>
-        <p:spPr>
-          <a:xfrm>
-            <a:off x="-873578" y="4767943"/>
-            <a:ext cx="7772400" cy="1463040"/>
-          </a:xfrm>
-        </p:spPr>
-        <p:txBody>
-          <a:bodyPr>
-            <a:normAutofit/>
-          </a:bodyPr>
-          <a:lstStyle/>
-          <a:p>
-            <a:r>
-              <a:rPr lang="es-CL" sz="2400" b="1" dirty="0"/>
-              <a:t>Conclusión y fin de la presentación</a:t>
-            </a:r>
-            <a:endParaRPr lang="es-CL" sz="2400" dirty="0"/>
-          </a:p>
-        </p:txBody>
-      </p:sp>
-      <p:sp>
-        <p:nvSpPr>
-          <p:cNvPr id="5" name="Rectángulo 4"/>
-          <p:cNvSpPr/>
-          <p:nvPr/>
-        </p:nvSpPr>
-        <p:spPr>
-          <a:xfrm>
-            <a:off x="7649937" y="4767943"/>
-            <a:ext cx="4408714" cy="1445079"/>
-          </a:xfrm>
-          <a:prstGeom prst="rect">
-            <a:avLst/>
-          </a:prstGeom>
-        </p:spPr>
-        <p:style>
-          <a:lnRef idx="2">
-            <a:schemeClr val="accent1">
-              <a:shade val="50000"/>
-            </a:schemeClr>
-          </a:lnRef>
-          <a:fillRef idx="1">
-            <a:schemeClr val="accent1"/>
-          </a:fillRef>
-          <a:effectRef idx="0">
-            <a:schemeClr val="accent1"/>
-          </a:effectRef>
-          <a:fontRef idx="minor">
-            <a:schemeClr val="lt1"/>
-          </a:fontRef>
-        </p:style>
-        <p:txBody>
-          <a:bodyPr rtlCol="0" anchor="ctr"/>
-          <a:lstStyle/>
-          <a:p>
-            <a:pPr algn="ctr"/>
-            <a:endParaRPr lang="es-CL"/>
-          </a:p>
-        </p:txBody>
-      </p:sp>
-      <p:pic>
-        <p:nvPicPr>
-          <p:cNvPr id="6" name="Imagen 5"/>
-          <p:cNvPicPr/>
-          <p:nvPr/>
-        </p:nvPicPr>
-        <p:blipFill>
-          <a:blip r:embed="rId2"/>
-          <a:stretch>
-            <a:fillRect/>
-          </a:stretch>
-        </p:blipFill>
-        <p:spPr>
-          <a:xfrm>
-            <a:off x="7772265" y="4841823"/>
-            <a:ext cx="4164058" cy="1082448"/>
-          </a:xfrm>
-          <a:prstGeom prst="rect">
-            <a:avLst/>
-          </a:prstGeom>
-        </p:spPr>
-      </p:pic>
-    </p:spTree>
-    <p:extLst>
-      <p:ext uri="{BB962C8B-B14F-4D97-AF65-F5344CB8AC3E}">
-        <p14:creationId xmlns:p14="http://schemas.microsoft.com/office/powerpoint/2010/main" val="3448379648"/>
-      </p:ext>
-    </p:extLst>
-  </p:cSld>
-  <p:clrMapOvr>
-    <a:masterClrMapping/>
-  </p:clrMapOvr>
-</p:sld>
-</file>
-
-<file path=ppt/slides/slide2.xml><?xml version="1.0" encoding="utf-8"?>
-<p:sld xmlns:a="http://schemas.openxmlformats.org/drawingml/2006/main" xmlns:r="http://schemas.openxmlformats.org/officeDocument/2006/relationships" xmlns:p="http://schemas.openxmlformats.org/presentationml/2006/main">
-  <p:cSld>
-    <p:spTree>
-      <p:nvGrpSpPr>
-        <p:cNvPr id="1" name=""/>
-        <p:cNvGrpSpPr/>
-        <p:nvPr/>
-      </p:nvGrpSpPr>
-      <p:grpSpPr>
-        <a:xfrm>
-          <a:off x="0" y="0"/>
-          <a:ext cx="0" cy="0"/>
-          <a:chOff x="0" y="0"/>
-          <a:chExt cx="0" cy="0"/>
-        </a:xfrm>
-      </p:grpSpPr>
-      <p:sp>
-        <p:nvSpPr>
-          <p:cNvPr id="2" name="Título 1">
-            <a:extLst>
-              <a:ext uri="{FF2B5EF4-FFF2-40B4-BE49-F238E27FC236}">
-                <a16:creationId xmlns:a16="http://schemas.microsoft.com/office/drawing/2014/main" id="{74BB6245-428F-ABF6-FD51-2BC7E7A1A430}"/>
-              </a:ext>
-            </a:extLst>
-          </p:cNvPr>
-          <p:cNvSpPr>
-            <a:spLocks noGrp="1"/>
-          </p:cNvSpPr>
-          <p:nvPr>
             <p:ph type="title"/>
           </p:nvPr>
         </p:nvSpPr>
@@ -22074,62 +20700,136 @@
           <a:lstStyle/>
           <a:p>
             <a:r>
-              <a:rPr lang="en-US" dirty="0"/>
-              <a:t>Microservicios</a:t>
+              <a:rPr lang="es-CL" dirty="0" smtClean="0"/>
+              <a:t>VISIÓN GENERAL</a:t>
             </a:r>
+            <a:endParaRPr lang="es-CL" dirty="0"/>
           </a:p>
         </p:txBody>
       </p:sp>
-      <p:pic>
-        <p:nvPicPr>
-          <p:cNvPr id="4" name="Marcador de contenido 3">
-            <a:extLst>
-              <a:ext uri="{FF2B5EF4-FFF2-40B4-BE49-F238E27FC236}">
-                <a16:creationId xmlns:a16="http://schemas.microsoft.com/office/drawing/2014/main" id="{590A471D-7234-34FB-8366-D554E11E0770}"/>
-              </a:ext>
-            </a:extLst>
-          </p:cNvPr>
-          <p:cNvPicPr>
-            <a:picLocks noGrp="1" noChangeAspect="1"/>
-          </p:cNvPicPr>
+      <p:sp>
+        <p:nvSpPr>
+          <p:cNvPr id="3" name="Marcador de contenido 2"/>
+          <p:cNvSpPr>
+            <a:spLocks noGrp="1"/>
+          </p:cNvSpPr>
           <p:nvPr>
             <p:ph idx="1"/>
           </p:nvPr>
-        </p:nvPicPr>
-        <p:blipFill>
-          <a:blip r:embed="rId2">
-            <a:extLst>
-              <a:ext uri="{28A0092B-C50C-407E-A947-70E740481C1C}">
-                <a14:useLocalDpi xmlns:a14="http://schemas.microsoft.com/office/drawing/2010/main" val="0"/>
-              </a:ext>
-            </a:extLst>
-          </a:blip>
-          <a:srcRect/>
-          <a:stretch>
-            <a:fillRect/>
-          </a:stretch>
-        </p:blipFill>
-        <p:spPr bwMode="auto">
-          <a:xfrm>
-            <a:off x="2382016" y="2286000"/>
-            <a:ext cx="7004106" cy="4022725"/>
-          </a:xfrm>
-          <a:prstGeom prst="rect">
-            <a:avLst/>
-          </a:prstGeom>
-          <a:noFill/>
-          <a:ln>
-            <a:noFill/>
-          </a:ln>
-          <a:effectLst>
-            <a:softEdge rad="0"/>
-          </a:effectLst>
-        </p:spPr>
-      </p:pic>
+        </p:nvSpPr>
+        <p:spPr/>
+        <p:txBody>
+          <a:bodyPr/>
+          <a:lstStyle/>
+          <a:p>
+            <a:r>
+              <a:rPr lang="es-ES" dirty="0"/>
+              <a:t>Se realizaron pruebas a un </a:t>
+            </a:r>
+            <a:r>
+              <a:rPr lang="es-ES" dirty="0" err="1"/>
+              <a:t>RestController</a:t>
+            </a:r>
+            <a:r>
+              <a:rPr lang="es-ES" dirty="0"/>
+              <a:t> y un </a:t>
+            </a:r>
+            <a:r>
+              <a:rPr lang="es-ES" dirty="0" err="1"/>
+              <a:t>Service</a:t>
+            </a:r>
+            <a:r>
+              <a:rPr lang="es-ES" dirty="0" smtClean="0"/>
+              <a:t>.</a:t>
+            </a:r>
+          </a:p>
+          <a:p>
+            <a:r>
+              <a:rPr lang="es-ES" dirty="0" smtClean="0"/>
+              <a:t>Se </a:t>
+            </a:r>
+            <a:r>
+              <a:rPr lang="es-ES" dirty="0"/>
+              <a:t>trabajó con las clases Usuario, Curso y Proveedor</a:t>
+            </a:r>
+            <a:r>
+              <a:rPr lang="es-ES" dirty="0" smtClean="0"/>
+              <a:t>.</a:t>
+            </a:r>
+          </a:p>
+          <a:p>
+            <a:r>
+              <a:rPr lang="es-ES" dirty="0" smtClean="0"/>
+              <a:t>Se </a:t>
+            </a:r>
+            <a:r>
+              <a:rPr lang="es-ES" dirty="0"/>
+              <a:t>aplicaron </a:t>
+            </a:r>
+            <a:r>
+              <a:rPr lang="es-ES" dirty="0" err="1"/>
+              <a:t>testings</a:t>
+            </a:r>
+            <a:r>
+              <a:rPr lang="es-ES" dirty="0"/>
+              <a:t> unitarios e integrados</a:t>
+            </a:r>
+            <a:r>
+              <a:rPr lang="es-ES" dirty="0" smtClean="0"/>
+              <a:t>.</a:t>
+            </a:r>
+          </a:p>
+          <a:p>
+            <a:r>
+              <a:rPr lang="es-ES" dirty="0" smtClean="0"/>
+              <a:t>Se </a:t>
+            </a:r>
+            <a:r>
+              <a:rPr lang="es-ES" dirty="0"/>
+              <a:t>reforzó el uso de </a:t>
+            </a:r>
+            <a:r>
+              <a:rPr lang="es-ES" dirty="0" err="1"/>
+              <a:t>JUnit</a:t>
+            </a:r>
+            <a:r>
+              <a:rPr lang="es-ES" dirty="0"/>
+              <a:t> y </a:t>
+            </a:r>
+            <a:r>
+              <a:rPr lang="es-ES" dirty="0" err="1"/>
+              <a:t>Mockito</a:t>
+            </a:r>
+            <a:r>
+              <a:rPr lang="es-ES" dirty="0" smtClean="0"/>
+              <a:t>.</a:t>
+            </a:r>
+          </a:p>
+          <a:p>
+            <a:r>
+              <a:rPr lang="es-ES" dirty="0" smtClean="0"/>
+              <a:t>Se </a:t>
+            </a:r>
+            <a:r>
+              <a:rPr lang="es-ES" dirty="0"/>
+              <a:t>valoró el </a:t>
+            </a:r>
+            <a:r>
+              <a:rPr lang="es-ES" dirty="0" err="1"/>
+              <a:t>testing</a:t>
+            </a:r>
+            <a:r>
+              <a:rPr lang="es-ES" dirty="0"/>
+              <a:t> como clave para la calidad del software.</a:t>
+            </a:r>
+            <a:endParaRPr lang="es-CL" dirty="0"/>
+          </a:p>
+        </p:txBody>
+      </p:sp>
     </p:spTree>
     <p:extLst>
       <p:ext uri="{BB962C8B-B14F-4D97-AF65-F5344CB8AC3E}">
-        <p14:creationId xmlns:p14="http://schemas.microsoft.com/office/powerpoint/2010/main" val="1169623067"/>
+        <p14:creationId xmlns:p14="http://schemas.microsoft.com/office/powerpoint/2010/main" val="1441071810"/>
       </p:ext>
     </p:extLst>
   </p:cSld>
@@ -22158,13 +20858,7 @@
       </p:grpSpPr>
       <p:sp>
         <p:nvSpPr>
-          <p:cNvPr id="2" name="Título 1">
-            <a:extLst>
-              <a:ext uri="{FF2B5EF4-FFF2-40B4-BE49-F238E27FC236}">
-                <a16:creationId xmlns:a16="http://schemas.microsoft.com/office/drawing/2014/main" id="{5A572430-8726-C651-8168-AD4BA383D82A}"/>
-              </a:ext>
-            </a:extLst>
-          </p:cNvPr>
+          <p:cNvPr id="2" name="Título 1"/>
           <p:cNvSpPr>
             <a:spLocks noGrp="1"/>
           </p:cNvSpPr>
@@ -22178,21 +20872,16 @@
           <a:lstStyle/>
           <a:p>
             <a:r>
-              <a:rPr lang="en-US" dirty="0"/>
-              <a:t>Diseño y Dependencias</a:t>
+              <a:rPr lang="es-CL" dirty="0" err="1" smtClean="0"/>
+              <a:t>microservicio</a:t>
             </a:r>
+            <a:endParaRPr lang="es-CL" dirty="0"/>
           </a:p>
         </p:txBody>
       </p:sp>
       <p:pic>
         <p:nvPicPr>
-          <p:cNvPr id="5" name="Marcador de contenido 4" descr="Imagen que contiene Logotipo&#10;&#10;El contenido generado por IA puede ser incorrecto.">
-            <a:extLst>
-              <a:ext uri="{FF2B5EF4-FFF2-40B4-BE49-F238E27FC236}">
-                <a16:creationId xmlns:a16="http://schemas.microsoft.com/office/drawing/2014/main" id="{754FA900-9297-8ED5-178E-A56157F3F188}"/>
-              </a:ext>
-            </a:extLst>
-          </p:cNvPr>
+          <p:cNvPr id="4" name="Marcador de contenido 3"/>
           <p:cNvPicPr>
             <a:picLocks noGrp="1" noChangeAspect="1"/>
           </p:cNvPicPr>
@@ -22201,1612 +20890,28 @@
           </p:nvPr>
         </p:nvPicPr>
         <p:blipFill>
-          <a:blip r:embed="rId2"/>
+          <a:blip r:embed="rId2">
+            <a:extLst>
+              <a:ext uri="{28A0092B-C50C-407E-A947-70E740481C1C}">
+                <a14:useLocalDpi xmlns:a14="http://schemas.microsoft.com/office/drawing/2010/main" val="0"/>
+              </a:ext>
+            </a:extLst>
+          </a:blip>
           <a:stretch>
             <a:fillRect/>
           </a:stretch>
         </p:blipFill>
         <p:spPr>
           <a:xfrm>
-            <a:off x="1024128" y="2872352"/>
-            <a:ext cx="4230014" cy="2220758"/>
+            <a:off x="2617089" y="2084832"/>
+            <a:ext cx="6534150" cy="4163564"/>
           </a:xfrm>
-        </p:spPr>
-      </p:pic>
-      <p:pic>
-        <p:nvPicPr>
-          <p:cNvPr id="7" name="Imagen 6" descr="Un globo de colores&#10;&#10;El contenido generado por IA puede ser incorrecto.">
-            <a:extLst>
-              <a:ext uri="{FF2B5EF4-FFF2-40B4-BE49-F238E27FC236}">
-                <a16:creationId xmlns:a16="http://schemas.microsoft.com/office/drawing/2014/main" id="{C7F390B9-2F81-BA2B-8DFB-D98BDEC1EDB5}"/>
-              </a:ext>
-            </a:extLst>
-          </p:cNvPr>
-          <p:cNvPicPr>
-            <a:picLocks noChangeAspect="1"/>
-          </p:cNvPicPr>
-          <p:nvPr/>
-        </p:nvPicPr>
-        <p:blipFill>
-          <a:blip r:embed="rId3"/>
-          <a:stretch>
-            <a:fillRect/>
-          </a:stretch>
-        </p:blipFill>
-        <p:spPr>
-          <a:xfrm>
-            <a:off x="6161690" y="3348615"/>
-            <a:ext cx="5006182" cy="1268232"/>
-          </a:xfrm>
-          <a:prstGeom prst="rect">
-            <a:avLst/>
-          </a:prstGeom>
         </p:spPr>
       </p:pic>
     </p:spTree>
     <p:extLst>
       <p:ext uri="{BB962C8B-B14F-4D97-AF65-F5344CB8AC3E}">
-        <p14:creationId xmlns:p14="http://schemas.microsoft.com/office/powerpoint/2010/main" val="2791203900"/>
-      </p:ext>
-    </p:extLst>
-  </p:cSld>
-  <p:clrMapOvr>
-    <a:masterClrMapping/>
-  </p:clrMapOvr>
-</p:sld>
-</file>
-
-<file path=ppt/slides/slide4.xml><?xml version="1.0" encoding="utf-8"?>
-<p:sld xmlns:a="http://schemas.openxmlformats.org/drawingml/2006/main" xmlns:r="http://schemas.openxmlformats.org/officeDocument/2006/relationships" xmlns:p="http://schemas.openxmlformats.org/presentationml/2006/main">
-  <p:cSld>
-    <p:spTree>
-      <p:nvGrpSpPr>
-        <p:cNvPr id="1" name=""/>
-        <p:cNvGrpSpPr/>
-        <p:nvPr/>
-      </p:nvGrpSpPr>
-      <p:grpSpPr>
-        <a:xfrm>
-          <a:off x="0" y="0"/>
-          <a:ext cx="0" cy="0"/>
-          <a:chOff x="0" y="0"/>
-          <a:chExt cx="0" cy="0"/>
-        </a:xfrm>
-      </p:grpSpPr>
-      <p:sp>
-        <p:nvSpPr>
-          <p:cNvPr id="2" name="Título 1">
-            <a:extLst>
-              <a:ext uri="{FF2B5EF4-FFF2-40B4-BE49-F238E27FC236}">
-                <a16:creationId xmlns:a16="http://schemas.microsoft.com/office/drawing/2014/main" id="{408C63F6-1FFE-78DC-3415-B5F98916B0B4}"/>
-              </a:ext>
-            </a:extLst>
-          </p:cNvPr>
-          <p:cNvSpPr>
-            <a:spLocks noGrp="1"/>
-          </p:cNvSpPr>
-          <p:nvPr>
-            <p:ph type="title"/>
-          </p:nvPr>
-        </p:nvSpPr>
-        <p:spPr/>
-        <p:txBody>
-          <a:bodyPr/>
-          <a:lstStyle/>
-          <a:p>
-            <a:r>
-              <a:rPr lang="en-US" dirty="0"/>
-              <a:t>Pom.xml</a:t>
-            </a:r>
-          </a:p>
-        </p:txBody>
-      </p:sp>
-      <p:pic>
-        <p:nvPicPr>
-          <p:cNvPr id="5" name="Marcador de contenido 4" descr="Texto&#10;&#10;El contenido generado por IA puede ser incorrecto.">
-            <a:extLst>
-              <a:ext uri="{FF2B5EF4-FFF2-40B4-BE49-F238E27FC236}">
-                <a16:creationId xmlns:a16="http://schemas.microsoft.com/office/drawing/2014/main" id="{01486D35-C904-6FAF-0251-3DE16DC033CF}"/>
-              </a:ext>
-            </a:extLst>
-          </p:cNvPr>
-          <p:cNvPicPr>
-            <a:picLocks noGrp="1" noChangeAspect="1"/>
-          </p:cNvPicPr>
-          <p:nvPr>
-            <p:ph idx="1"/>
-          </p:nvPr>
-        </p:nvPicPr>
-        <p:blipFill>
-          <a:blip r:embed="rId2"/>
-          <a:stretch>
-            <a:fillRect/>
-          </a:stretch>
-        </p:blipFill>
-        <p:spPr>
-          <a:xfrm>
-            <a:off x="2584387" y="2310702"/>
-            <a:ext cx="6599552" cy="1736724"/>
-          </a:xfrm>
-        </p:spPr>
-      </p:pic>
-      <p:pic>
-        <p:nvPicPr>
-          <p:cNvPr id="7" name="Imagen 6" descr="Interfaz de usuario gráfica, Aplicación, Sitio web&#10;&#10;El contenido generado por IA puede ser incorrecto.">
-            <a:extLst>
-              <a:ext uri="{FF2B5EF4-FFF2-40B4-BE49-F238E27FC236}">
-                <a16:creationId xmlns:a16="http://schemas.microsoft.com/office/drawing/2014/main" id="{517A23E7-F598-5369-CA57-740F7F41300B}"/>
-              </a:ext>
-            </a:extLst>
-          </p:cNvPr>
-          <p:cNvPicPr>
-            <a:picLocks noChangeAspect="1"/>
-          </p:cNvPicPr>
-          <p:nvPr/>
-        </p:nvPicPr>
-        <p:blipFill>
-          <a:blip r:embed="rId3"/>
-          <a:stretch>
-            <a:fillRect/>
-          </a:stretch>
-        </p:blipFill>
-        <p:spPr>
-          <a:xfrm>
-            <a:off x="2584387" y="4248912"/>
-            <a:ext cx="6599553" cy="1565710"/>
-          </a:xfrm>
-          <a:prstGeom prst="rect">
-            <a:avLst/>
-          </a:prstGeom>
-        </p:spPr>
-      </p:pic>
-    </p:spTree>
-    <p:extLst>
-      <p:ext uri="{BB962C8B-B14F-4D97-AF65-F5344CB8AC3E}">
-        <p14:creationId xmlns:p14="http://schemas.microsoft.com/office/powerpoint/2010/main" val="2367254774"/>
-      </p:ext>
-    </p:extLst>
-  </p:cSld>
-  <p:clrMapOvr>
-    <a:masterClrMapping/>
-  </p:clrMapOvr>
-</p:sld>
-</file>
-
-<file path=ppt/slides/slide5.xml><?xml version="1.0" encoding="utf-8"?>
-<p:sld xmlns:a="http://schemas.openxmlformats.org/drawingml/2006/main" xmlns:r="http://schemas.openxmlformats.org/officeDocument/2006/relationships" xmlns:p="http://schemas.openxmlformats.org/presentationml/2006/main">
-  <p:cSld>
-    <p:spTree>
-      <p:nvGrpSpPr>
-        <p:cNvPr id="1" name=""/>
-        <p:cNvGrpSpPr/>
-        <p:nvPr/>
-      </p:nvGrpSpPr>
-      <p:grpSpPr>
-        <a:xfrm>
-          <a:off x="0" y="0"/>
-          <a:ext cx="0" cy="0"/>
-          <a:chOff x="0" y="0"/>
-          <a:chExt cx="0" cy="0"/>
-        </a:xfrm>
-      </p:grpSpPr>
-      <p:sp>
-        <p:nvSpPr>
-          <p:cNvPr id="2" name="Título 1">
-            <a:extLst>
-              <a:ext uri="{FF2B5EF4-FFF2-40B4-BE49-F238E27FC236}">
-                <a16:creationId xmlns:a16="http://schemas.microsoft.com/office/drawing/2014/main" id="{6C0D5614-7325-86D9-D840-97468AE8E059}"/>
-              </a:ext>
-            </a:extLst>
-          </p:cNvPr>
-          <p:cNvSpPr>
-            <a:spLocks noGrp="1"/>
-          </p:cNvSpPr>
-          <p:nvPr>
-            <p:ph type="title"/>
-          </p:nvPr>
-        </p:nvSpPr>
-        <p:spPr/>
-        <p:txBody>
-          <a:bodyPr/>
-          <a:lstStyle/>
-          <a:p>
-            <a:r>
-              <a:rPr lang="en-US" dirty="0"/>
-              <a:t>Linea de </a:t>
-            </a:r>
-            <a:r>
-              <a:rPr lang="en-US" dirty="0" err="1"/>
-              <a:t>Trabajo</a:t>
-            </a:r>
-            <a:endParaRPr lang="en-US" dirty="0"/>
-          </a:p>
-        </p:txBody>
-      </p:sp>
-      <p:sp>
-        <p:nvSpPr>
-          <p:cNvPr id="3" name="Marcador de contenido 2">
-            <a:extLst>
-              <a:ext uri="{FF2B5EF4-FFF2-40B4-BE49-F238E27FC236}">
-                <a16:creationId xmlns:a16="http://schemas.microsoft.com/office/drawing/2014/main" id="{799110C3-6B04-2E9F-8F48-23BCD38CCC5B}"/>
-              </a:ext>
-            </a:extLst>
-          </p:cNvPr>
-          <p:cNvSpPr>
-            <a:spLocks noGrp="1"/>
-          </p:cNvSpPr>
-          <p:nvPr>
-            <p:ph idx="1"/>
-          </p:nvPr>
-        </p:nvSpPr>
-        <p:spPr/>
-        <p:txBody>
-          <a:bodyPr/>
-          <a:lstStyle/>
-          <a:p>
-            <a:r>
-              <a:rPr lang="en-US" i="1" dirty="0" err="1"/>
-              <a:t>Arquitectura</a:t>
-            </a:r>
-            <a:r>
-              <a:rPr lang="en-US" i="1" dirty="0"/>
-              <a:t> de Microservicios, Por </a:t>
-            </a:r>
-            <a:r>
-              <a:rPr lang="en-US" i="1" dirty="0" err="1"/>
-              <a:t>Capas</a:t>
-            </a:r>
-            <a:r>
-              <a:rPr lang="en-US" i="1" dirty="0"/>
-              <a:t>, REST API</a:t>
-            </a:r>
-            <a:endParaRPr lang="en-US" dirty="0"/>
-          </a:p>
-        </p:txBody>
-      </p:sp>
-      <p:pic>
-        <p:nvPicPr>
-          <p:cNvPr id="4" name="Marcador de contenido 4" descr="Imagen que contiene Logotipo&#10;&#10;El contenido generado por IA puede ser incorrecto.">
-            <a:extLst>
-              <a:ext uri="{FF2B5EF4-FFF2-40B4-BE49-F238E27FC236}">
-                <a16:creationId xmlns:a16="http://schemas.microsoft.com/office/drawing/2014/main" id="{7E8DF666-BAC2-DFB3-8E17-2D17D7517D7F}"/>
-              </a:ext>
-            </a:extLst>
-          </p:cNvPr>
-          <p:cNvPicPr>
-            <a:picLocks noChangeAspect="1"/>
-          </p:cNvPicPr>
-          <p:nvPr/>
-        </p:nvPicPr>
-        <p:blipFill>
-          <a:blip r:embed="rId2"/>
-          <a:stretch>
-            <a:fillRect/>
-          </a:stretch>
-        </p:blipFill>
-        <p:spPr>
-          <a:xfrm>
-            <a:off x="625036" y="5214562"/>
-            <a:ext cx="2468948" cy="1296198"/>
-          </a:xfrm>
-          <a:prstGeom prst="rect">
-            <a:avLst/>
-          </a:prstGeom>
-        </p:spPr>
-      </p:pic>
-      <p:pic>
-        <p:nvPicPr>
-          <p:cNvPr id="6" name="Imagen 5" descr="Logotipo&#10;&#10;El contenido generado por IA puede ser incorrecto.">
-            <a:extLst>
-              <a:ext uri="{FF2B5EF4-FFF2-40B4-BE49-F238E27FC236}">
-                <a16:creationId xmlns:a16="http://schemas.microsoft.com/office/drawing/2014/main" id="{7FC1060A-1377-DCF8-A36C-1B6E90B00B08}"/>
-              </a:ext>
-            </a:extLst>
-          </p:cNvPr>
-          <p:cNvPicPr>
-            <a:picLocks noChangeAspect="1"/>
-          </p:cNvPicPr>
-          <p:nvPr/>
-        </p:nvPicPr>
-        <p:blipFill>
-          <a:blip r:embed="rId3"/>
-          <a:stretch>
-            <a:fillRect/>
-          </a:stretch>
-        </p:blipFill>
-        <p:spPr>
-          <a:xfrm>
-            <a:off x="4965700" y="4732361"/>
-            <a:ext cx="2260600" cy="2260600"/>
-          </a:xfrm>
-          <a:prstGeom prst="rect">
-            <a:avLst/>
-          </a:prstGeom>
-        </p:spPr>
-      </p:pic>
-      <p:pic>
-        <p:nvPicPr>
-          <p:cNvPr id="8" name="Imagen 7" descr="Logotipo&#10;&#10;El contenido generado por IA puede ser incorrecto.">
-            <a:extLst>
-              <a:ext uri="{FF2B5EF4-FFF2-40B4-BE49-F238E27FC236}">
-                <a16:creationId xmlns:a16="http://schemas.microsoft.com/office/drawing/2014/main" id="{20AE9927-BE41-AFC5-E9F0-9A3C17848042}"/>
-              </a:ext>
-            </a:extLst>
-          </p:cNvPr>
-          <p:cNvPicPr>
-            <a:picLocks noChangeAspect="1"/>
-          </p:cNvPicPr>
-          <p:nvPr/>
-        </p:nvPicPr>
-        <p:blipFill>
-          <a:blip r:embed="rId4"/>
-          <a:stretch>
-            <a:fillRect/>
-          </a:stretch>
-        </p:blipFill>
-        <p:spPr>
-          <a:xfrm>
-            <a:off x="9849010" y="4626679"/>
-            <a:ext cx="1833701" cy="1648211"/>
-          </a:xfrm>
-          <a:prstGeom prst="rect">
-            <a:avLst/>
-          </a:prstGeom>
-        </p:spPr>
-      </p:pic>
-    </p:spTree>
-    <p:extLst>
-      <p:ext uri="{BB962C8B-B14F-4D97-AF65-F5344CB8AC3E}">
-        <p14:creationId xmlns:p14="http://schemas.microsoft.com/office/powerpoint/2010/main" val="3271961495"/>
-      </p:ext>
-    </p:extLst>
-  </p:cSld>
-  <p:clrMapOvr>
-    <a:masterClrMapping/>
-  </p:clrMapOvr>
-</p:sld>
-</file>
-
-<file path=ppt/slides/slide6.xml><?xml version="1.0" encoding="utf-8"?>
-<p:sld xmlns:a="http://schemas.openxmlformats.org/drawingml/2006/main" xmlns:r="http://schemas.openxmlformats.org/officeDocument/2006/relationships" xmlns:p="http://schemas.openxmlformats.org/presentationml/2006/main">
-  <p:cSld>
-    <p:spTree>
-      <p:nvGrpSpPr>
-        <p:cNvPr id="1" name=""/>
-        <p:cNvGrpSpPr/>
-        <p:nvPr/>
-      </p:nvGrpSpPr>
-      <p:grpSpPr>
-        <a:xfrm>
-          <a:off x="0" y="0"/>
-          <a:ext cx="0" cy="0"/>
-          <a:chOff x="0" y="0"/>
-          <a:chExt cx="0" cy="0"/>
-        </a:xfrm>
-      </p:grpSpPr>
-      <p:sp>
-        <p:nvSpPr>
-          <p:cNvPr id="2" name="Título 1">
-            <a:extLst>
-              <a:ext uri="{FF2B5EF4-FFF2-40B4-BE49-F238E27FC236}">
-                <a16:creationId xmlns:a16="http://schemas.microsoft.com/office/drawing/2014/main" id="{08AB364F-DA6C-3126-67E9-0B9E7F23D65D}"/>
-              </a:ext>
-            </a:extLst>
-          </p:cNvPr>
-          <p:cNvSpPr>
-            <a:spLocks noGrp="1"/>
-          </p:cNvSpPr>
-          <p:nvPr>
-            <p:ph type="title"/>
-          </p:nvPr>
-        </p:nvSpPr>
-        <p:spPr/>
-        <p:txBody>
-          <a:bodyPr/>
-          <a:lstStyle/>
-          <a:p>
-            <a:r>
-              <a:rPr lang="en-US" dirty="0" err="1"/>
-              <a:t>Trabajo</a:t>
-            </a:r>
-            <a:r>
-              <a:rPr lang="en-US" dirty="0"/>
-              <a:t> </a:t>
-            </a:r>
-            <a:r>
-              <a:rPr lang="en-US" dirty="0" err="1"/>
-              <a:t>Colaborativo</a:t>
-            </a:r>
-            <a:endParaRPr lang="en-US" dirty="0"/>
-          </a:p>
-        </p:txBody>
-      </p:sp>
-      <p:pic>
-        <p:nvPicPr>
-          <p:cNvPr id="9" name="Imagen 8" descr="Interfaz de usuario gráfica, Texto, Aplicación&#10;&#10;El contenido generado por IA puede ser incorrecto.">
-            <a:extLst>
-              <a:ext uri="{FF2B5EF4-FFF2-40B4-BE49-F238E27FC236}">
-                <a16:creationId xmlns:a16="http://schemas.microsoft.com/office/drawing/2014/main" id="{EE61A7E0-45BF-0437-30AE-CD697209FE85}"/>
-              </a:ext>
-            </a:extLst>
-          </p:cNvPr>
-          <p:cNvPicPr>
-            <a:picLocks noChangeAspect="1"/>
-          </p:cNvPicPr>
-          <p:nvPr/>
-        </p:nvPicPr>
-        <p:blipFill>
-          <a:blip r:embed="rId2"/>
-          <a:stretch>
-            <a:fillRect/>
-          </a:stretch>
-        </p:blipFill>
-        <p:spPr>
-          <a:xfrm>
-            <a:off x="7437120" y="2611120"/>
-            <a:ext cx="4516687" cy="4023360"/>
-          </a:xfrm>
-          <a:prstGeom prst="rect">
-            <a:avLst/>
-          </a:prstGeom>
-        </p:spPr>
-      </p:pic>
-      <p:pic>
-        <p:nvPicPr>
-          <p:cNvPr id="11" name="Imagen 10" descr="Icono&#10;&#10;El contenido generado por IA puede ser incorrecto.">
-            <a:extLst>
-              <a:ext uri="{FF2B5EF4-FFF2-40B4-BE49-F238E27FC236}">
-                <a16:creationId xmlns:a16="http://schemas.microsoft.com/office/drawing/2014/main" id="{8C0A13F9-27C4-55F6-D1BF-85E286237ADD}"/>
-              </a:ext>
-            </a:extLst>
-          </p:cNvPr>
-          <p:cNvPicPr>
-            <a:picLocks noChangeAspect="1"/>
-          </p:cNvPicPr>
-          <p:nvPr/>
-        </p:nvPicPr>
-        <p:blipFill>
-          <a:blip r:embed="rId3"/>
-          <a:stretch>
-            <a:fillRect/>
-          </a:stretch>
-        </p:blipFill>
-        <p:spPr>
-          <a:xfrm>
-            <a:off x="1024128" y="3234496"/>
-            <a:ext cx="1881632" cy="1881632"/>
-          </a:xfrm>
-          <a:prstGeom prst="rect">
-            <a:avLst/>
-          </a:prstGeom>
-        </p:spPr>
-      </p:pic>
-      <p:pic>
-        <p:nvPicPr>
-          <p:cNvPr id="13" name="Imagen 12" descr="Forma&#10;&#10;El contenido generado por IA puede ser incorrecto.">
-            <a:extLst>
-              <a:ext uri="{FF2B5EF4-FFF2-40B4-BE49-F238E27FC236}">
-                <a16:creationId xmlns:a16="http://schemas.microsoft.com/office/drawing/2014/main" id="{5A517D45-EA98-0586-FED0-C189C3AA0251}"/>
-              </a:ext>
-            </a:extLst>
-          </p:cNvPr>
-          <p:cNvPicPr>
-            <a:picLocks noChangeAspect="1"/>
-          </p:cNvPicPr>
-          <p:nvPr/>
-        </p:nvPicPr>
-        <p:blipFill>
-          <a:blip r:embed="rId4"/>
-          <a:stretch>
-            <a:fillRect/>
-          </a:stretch>
-        </p:blipFill>
-        <p:spPr>
-          <a:xfrm>
-            <a:off x="3515360" y="3234496"/>
-            <a:ext cx="3312160" cy="1863090"/>
-          </a:xfrm>
-          <a:prstGeom prst="rect">
-            <a:avLst/>
-          </a:prstGeom>
-        </p:spPr>
-      </p:pic>
-    </p:spTree>
-    <p:extLst>
-      <p:ext uri="{BB962C8B-B14F-4D97-AF65-F5344CB8AC3E}">
-        <p14:creationId xmlns:p14="http://schemas.microsoft.com/office/powerpoint/2010/main" val="926518846"/>
-      </p:ext>
-    </p:extLst>
-  </p:cSld>
-  <p:clrMapOvr>
-    <a:masterClrMapping/>
-  </p:clrMapOvr>
-</p:sld>
-</file>
-
-<file path=ppt/slides/slide7.xml><?xml version="1.0" encoding="utf-8"?>
-<p:sld xmlns:a="http://schemas.openxmlformats.org/drawingml/2006/main" xmlns:r="http://schemas.openxmlformats.org/officeDocument/2006/relationships" xmlns:p="http://schemas.openxmlformats.org/presentationml/2006/main">
-  <p:cSld>
-    <p:spTree>
-      <p:nvGrpSpPr>
-        <p:cNvPr id="1" name=""/>
-        <p:cNvGrpSpPr/>
-        <p:nvPr/>
-      </p:nvGrpSpPr>
-      <p:grpSpPr>
-        <a:xfrm>
-          <a:off x="0" y="0"/>
-          <a:ext cx="0" cy="0"/>
-          <a:chOff x="0" y="0"/>
-          <a:chExt cx="0" cy="0"/>
-        </a:xfrm>
-      </p:grpSpPr>
-      <p:sp>
-        <p:nvSpPr>
-          <p:cNvPr id="2" name="Título 1">
-            <a:extLst>
-              <a:ext uri="{FF2B5EF4-FFF2-40B4-BE49-F238E27FC236}">
-                <a16:creationId xmlns:a16="http://schemas.microsoft.com/office/drawing/2014/main" id="{45A9B64A-51D4-8188-A93E-8356E327A6F6}"/>
-              </a:ext>
-            </a:extLst>
-          </p:cNvPr>
-          <p:cNvSpPr>
-            <a:spLocks noGrp="1"/>
-          </p:cNvSpPr>
-          <p:nvPr>
-            <p:ph type="title"/>
-          </p:nvPr>
-        </p:nvSpPr>
-        <p:spPr/>
-        <p:txBody>
-          <a:bodyPr/>
-          <a:lstStyle/>
-          <a:p>
-            <a:r>
-              <a:rPr lang="en-US" dirty="0"/>
-              <a:t>Git y GitHub</a:t>
-            </a:r>
-          </a:p>
-        </p:txBody>
-      </p:sp>
-      <p:pic>
-        <p:nvPicPr>
-          <p:cNvPr id="5" name="Marcador de contenido 4" descr="Texto&#10;&#10;El contenido generado por IA puede ser incorrecto.">
-            <a:extLst>
-              <a:ext uri="{FF2B5EF4-FFF2-40B4-BE49-F238E27FC236}">
-                <a16:creationId xmlns:a16="http://schemas.microsoft.com/office/drawing/2014/main" id="{6A0067BF-F2B8-25B1-6EC6-1208CC1BC839}"/>
-              </a:ext>
-            </a:extLst>
-          </p:cNvPr>
-          <p:cNvPicPr>
-            <a:picLocks noGrp="1" noChangeAspect="1"/>
-          </p:cNvPicPr>
-          <p:nvPr>
-            <p:ph idx="1"/>
-          </p:nvPr>
-        </p:nvPicPr>
-        <p:blipFill>
-          <a:blip r:embed="rId2"/>
-          <a:stretch>
-            <a:fillRect/>
-          </a:stretch>
-        </p:blipFill>
-        <p:spPr>
-          <a:xfrm>
-            <a:off x="216976" y="4509365"/>
-            <a:ext cx="6881456" cy="2019475"/>
-          </a:xfrm>
-          <a:effectLst>
-            <a:softEdge rad="38100"/>
-          </a:effectLst>
-        </p:spPr>
-      </p:pic>
-      <p:pic>
-        <p:nvPicPr>
-          <p:cNvPr id="9" name="Imagen 8" descr="Texto&#10;&#10;El contenido generado por IA puede ser incorrecto.">
-            <a:extLst>
-              <a:ext uri="{FF2B5EF4-FFF2-40B4-BE49-F238E27FC236}">
-                <a16:creationId xmlns:a16="http://schemas.microsoft.com/office/drawing/2014/main" id="{C5C8DD24-60A8-8989-08D1-46F2633010FE}"/>
-              </a:ext>
-            </a:extLst>
-          </p:cNvPr>
-          <p:cNvPicPr>
-            <a:picLocks noChangeAspect="1"/>
-          </p:cNvPicPr>
-          <p:nvPr/>
-        </p:nvPicPr>
-        <p:blipFill>
-          <a:blip r:embed="rId3"/>
-          <a:stretch>
-            <a:fillRect/>
-          </a:stretch>
-        </p:blipFill>
-        <p:spPr>
-          <a:xfrm>
-            <a:off x="216976" y="2743140"/>
-            <a:ext cx="4930567" cy="1371719"/>
-          </a:xfrm>
-          <a:prstGeom prst="rect">
-            <a:avLst/>
-          </a:prstGeom>
-          <a:effectLst>
-            <a:softEdge rad="38100"/>
-          </a:effectLst>
-        </p:spPr>
-      </p:pic>
-      <p:pic>
-        <p:nvPicPr>
-          <p:cNvPr id="11" name="Imagen 10" descr="Texto&#10;&#10;El contenido generado por IA puede ser incorrecto.">
-            <a:extLst>
-              <a:ext uri="{FF2B5EF4-FFF2-40B4-BE49-F238E27FC236}">
-                <a16:creationId xmlns:a16="http://schemas.microsoft.com/office/drawing/2014/main" id="{693C8004-E73E-6FDC-E4E2-85981D6BE1F6}"/>
-              </a:ext>
-            </a:extLst>
-          </p:cNvPr>
-          <p:cNvPicPr>
-            <a:picLocks noChangeAspect="1"/>
-          </p:cNvPicPr>
-          <p:nvPr/>
-        </p:nvPicPr>
-        <p:blipFill>
-          <a:blip r:embed="rId4"/>
-          <a:stretch>
-            <a:fillRect/>
-          </a:stretch>
-        </p:blipFill>
-        <p:spPr>
-          <a:xfrm>
-            <a:off x="7501696" y="4471262"/>
-            <a:ext cx="4473328" cy="2057578"/>
-          </a:xfrm>
-          <a:prstGeom prst="rect">
-            <a:avLst/>
-          </a:prstGeom>
-          <a:effectLst>
-            <a:softEdge rad="38100"/>
-          </a:effectLst>
-        </p:spPr>
-      </p:pic>
-      <p:pic>
-        <p:nvPicPr>
-          <p:cNvPr id="15" name="Imagen 14" descr="Captura de pantalla de computadora&#10;&#10;El contenido generado por IA puede ser incorrecto.">
-            <a:extLst>
-              <a:ext uri="{FF2B5EF4-FFF2-40B4-BE49-F238E27FC236}">
-                <a16:creationId xmlns:a16="http://schemas.microsoft.com/office/drawing/2014/main" id="{9731D54B-A722-140C-4121-9B18AD9D81C1}"/>
-              </a:ext>
-            </a:extLst>
-          </p:cNvPr>
-          <p:cNvPicPr>
-            <a:picLocks noChangeAspect="1"/>
-          </p:cNvPicPr>
-          <p:nvPr/>
-        </p:nvPicPr>
-        <p:blipFill>
-          <a:blip r:embed="rId5"/>
-          <a:stretch>
-            <a:fillRect/>
-          </a:stretch>
-        </p:blipFill>
-        <p:spPr>
-          <a:xfrm>
-            <a:off x="6020023" y="1269106"/>
-            <a:ext cx="5955001" cy="2845753"/>
-          </a:xfrm>
-          <a:prstGeom prst="rect">
-            <a:avLst/>
-          </a:prstGeom>
-          <a:effectLst>
-            <a:softEdge rad="38100"/>
-          </a:effectLst>
-        </p:spPr>
-      </p:pic>
-      <p:sp>
-        <p:nvSpPr>
-          <p:cNvPr id="16" name="CuadroTexto 15">
-            <a:extLst>
-              <a:ext uri="{FF2B5EF4-FFF2-40B4-BE49-F238E27FC236}">
-                <a16:creationId xmlns:a16="http://schemas.microsoft.com/office/drawing/2014/main" id="{AFD760BE-8276-8F1F-28FD-AACF93B0BF2C}"/>
-              </a:ext>
-            </a:extLst>
-          </p:cNvPr>
-          <p:cNvSpPr txBox="1"/>
-          <p:nvPr/>
-        </p:nvSpPr>
-        <p:spPr>
-          <a:xfrm>
-            <a:off x="216976" y="2435363"/>
-            <a:ext cx="2039213" cy="307777"/>
-          </a:xfrm>
-          <a:prstGeom prst="rect">
-            <a:avLst/>
-          </a:prstGeom>
-          <a:noFill/>
-        </p:spPr>
-        <p:txBody>
-          <a:bodyPr wrap="none" rtlCol="0">
-            <a:spAutoFit/>
-          </a:bodyPr>
-          <a:lstStyle/>
-          <a:p>
-            <a:r>
-              <a:rPr lang="en-US" sz="1400" i="1" dirty="0">
-                <a:solidFill>
-                  <a:schemeClr val="tx1">
-                    <a:lumMod val="50000"/>
-                    <a:lumOff val="50000"/>
-                  </a:schemeClr>
-                </a:solidFill>
-              </a:rPr>
-              <a:t>Marcar y </a:t>
-            </a:r>
-            <a:r>
-              <a:rPr lang="en-US" sz="1400" i="1" dirty="0" err="1">
-                <a:solidFill>
-                  <a:schemeClr val="tx1">
-                    <a:lumMod val="50000"/>
-                    <a:lumOff val="50000"/>
-                  </a:schemeClr>
-                </a:solidFill>
-              </a:rPr>
-              <a:t>guardar</a:t>
-            </a:r>
-            <a:r>
-              <a:rPr lang="en-US" sz="1400" i="1" dirty="0">
-                <a:solidFill>
-                  <a:schemeClr val="tx1">
-                    <a:lumMod val="50000"/>
-                    <a:lumOff val="50000"/>
-                  </a:schemeClr>
-                </a:solidFill>
-              </a:rPr>
-              <a:t> </a:t>
-            </a:r>
-            <a:r>
-              <a:rPr lang="en-US" sz="1400" i="1" dirty="0" err="1">
-                <a:solidFill>
-                  <a:schemeClr val="tx1">
-                    <a:lumMod val="50000"/>
-                    <a:lumOff val="50000"/>
-                  </a:schemeClr>
-                </a:solidFill>
-              </a:rPr>
-              <a:t>cambios</a:t>
-            </a:r>
-            <a:endParaRPr lang="en-US" sz="1400" i="1" dirty="0">
-              <a:solidFill>
-                <a:schemeClr val="tx1">
-                  <a:lumMod val="50000"/>
-                  <a:lumOff val="50000"/>
-                </a:schemeClr>
-              </a:solidFill>
-            </a:endParaRPr>
-          </a:p>
-        </p:txBody>
-      </p:sp>
-      <p:sp>
-        <p:nvSpPr>
-          <p:cNvPr id="17" name="CuadroTexto 16">
-            <a:extLst>
-              <a:ext uri="{FF2B5EF4-FFF2-40B4-BE49-F238E27FC236}">
-                <a16:creationId xmlns:a16="http://schemas.microsoft.com/office/drawing/2014/main" id="{6C689BE9-92D8-6C59-5DFE-AD50D835F406}"/>
-              </a:ext>
-            </a:extLst>
-          </p:cNvPr>
-          <p:cNvSpPr txBox="1"/>
-          <p:nvPr/>
-        </p:nvSpPr>
-        <p:spPr>
-          <a:xfrm>
-            <a:off x="6020023" y="961329"/>
-            <a:ext cx="2252411" cy="307777"/>
-          </a:xfrm>
-          <a:prstGeom prst="rect">
-            <a:avLst/>
-          </a:prstGeom>
-          <a:noFill/>
-        </p:spPr>
-        <p:txBody>
-          <a:bodyPr wrap="none" rtlCol="0">
-            <a:spAutoFit/>
-          </a:bodyPr>
-          <a:lstStyle/>
-          <a:p>
-            <a:r>
-              <a:rPr lang="en-US" sz="1400" i="1" dirty="0">
-                <a:solidFill>
-                  <a:schemeClr val="tx1">
-                    <a:lumMod val="50000"/>
-                    <a:lumOff val="50000"/>
-                  </a:schemeClr>
-                </a:solidFill>
-              </a:rPr>
-              <a:t>Nuestro </a:t>
-            </a:r>
-            <a:r>
-              <a:rPr lang="en-US" sz="1400" i="1" dirty="0" err="1">
-                <a:solidFill>
-                  <a:schemeClr val="tx1">
-                    <a:lumMod val="50000"/>
-                    <a:lumOff val="50000"/>
-                  </a:schemeClr>
-                </a:solidFill>
-              </a:rPr>
-              <a:t>repositorio</a:t>
-            </a:r>
-            <a:r>
-              <a:rPr lang="en-US" sz="1400" i="1" dirty="0">
-                <a:solidFill>
-                  <a:schemeClr val="tx1">
-                    <a:lumMod val="50000"/>
-                    <a:lumOff val="50000"/>
-                  </a:schemeClr>
-                </a:solidFill>
-              </a:rPr>
-              <a:t> </a:t>
-            </a:r>
-            <a:r>
-              <a:rPr lang="en-US" sz="1400" i="1" dirty="0" err="1">
-                <a:solidFill>
-                  <a:schemeClr val="tx1">
-                    <a:lumMod val="50000"/>
-                    <a:lumOff val="50000"/>
-                  </a:schemeClr>
-                </a:solidFill>
-              </a:rPr>
-              <a:t>en</a:t>
-            </a:r>
-            <a:r>
-              <a:rPr lang="en-US" sz="1400" i="1" dirty="0">
-                <a:solidFill>
-                  <a:schemeClr val="tx1">
-                    <a:lumMod val="50000"/>
-                    <a:lumOff val="50000"/>
-                  </a:schemeClr>
-                </a:solidFill>
-              </a:rPr>
-              <a:t> GitHub</a:t>
-            </a:r>
-          </a:p>
-        </p:txBody>
-      </p:sp>
-      <p:sp>
-        <p:nvSpPr>
-          <p:cNvPr id="18" name="CuadroTexto 17">
-            <a:extLst>
-              <a:ext uri="{FF2B5EF4-FFF2-40B4-BE49-F238E27FC236}">
-                <a16:creationId xmlns:a16="http://schemas.microsoft.com/office/drawing/2014/main" id="{03DE4EE0-44D4-1B45-5AFD-FB43E8B0065F}"/>
-              </a:ext>
-            </a:extLst>
-          </p:cNvPr>
-          <p:cNvSpPr txBox="1"/>
-          <p:nvPr/>
-        </p:nvSpPr>
-        <p:spPr>
-          <a:xfrm>
-            <a:off x="216976" y="4228785"/>
-            <a:ext cx="2069797" cy="307777"/>
-          </a:xfrm>
-          <a:prstGeom prst="rect">
-            <a:avLst/>
-          </a:prstGeom>
-          <a:noFill/>
-        </p:spPr>
-        <p:txBody>
-          <a:bodyPr wrap="none" rtlCol="0">
-            <a:spAutoFit/>
-          </a:bodyPr>
-          <a:lstStyle/>
-          <a:p>
-            <a:r>
-              <a:rPr lang="en-US" sz="1400" i="1" dirty="0">
-                <a:solidFill>
-                  <a:schemeClr val="tx1">
-                    <a:lumMod val="50000"/>
-                    <a:lumOff val="50000"/>
-                  </a:schemeClr>
-                </a:solidFill>
-              </a:rPr>
-              <a:t>Estado del </a:t>
-            </a:r>
-            <a:r>
-              <a:rPr lang="en-US" sz="1400" i="1" dirty="0" err="1">
-                <a:solidFill>
-                  <a:schemeClr val="tx1">
-                    <a:lumMod val="50000"/>
-                    <a:lumOff val="50000"/>
-                  </a:schemeClr>
-                </a:solidFill>
-              </a:rPr>
-              <a:t>repositorio</a:t>
-            </a:r>
-            <a:r>
-              <a:rPr lang="en-US" sz="1400" i="1" dirty="0">
-                <a:solidFill>
-                  <a:schemeClr val="tx1">
-                    <a:lumMod val="50000"/>
-                    <a:lumOff val="50000"/>
-                  </a:schemeClr>
-                </a:solidFill>
-              </a:rPr>
-              <a:t> local</a:t>
-            </a:r>
-          </a:p>
-        </p:txBody>
-      </p:sp>
-      <p:sp>
-        <p:nvSpPr>
-          <p:cNvPr id="19" name="CuadroTexto 18">
-            <a:extLst>
-              <a:ext uri="{FF2B5EF4-FFF2-40B4-BE49-F238E27FC236}">
-                <a16:creationId xmlns:a16="http://schemas.microsoft.com/office/drawing/2014/main" id="{793996D4-74F3-E75C-00D0-902C4B958876}"/>
-              </a:ext>
-            </a:extLst>
-          </p:cNvPr>
-          <p:cNvSpPr txBox="1"/>
-          <p:nvPr/>
-        </p:nvSpPr>
-        <p:spPr>
-          <a:xfrm>
-            <a:off x="7501696" y="4194059"/>
-            <a:ext cx="2658100" cy="307777"/>
-          </a:xfrm>
-          <a:prstGeom prst="rect">
-            <a:avLst/>
-          </a:prstGeom>
-          <a:noFill/>
-        </p:spPr>
-        <p:txBody>
-          <a:bodyPr wrap="none" rtlCol="0">
-            <a:spAutoFit/>
-          </a:bodyPr>
-          <a:lstStyle/>
-          <a:p>
-            <a:r>
-              <a:rPr lang="en-US" sz="1400" i="1" dirty="0">
-                <a:solidFill>
-                  <a:schemeClr val="tx1">
-                    <a:lumMod val="50000"/>
-                    <a:lumOff val="50000"/>
-                  </a:schemeClr>
-                </a:solidFill>
-              </a:rPr>
-              <a:t>Subir </a:t>
-            </a:r>
-            <a:r>
-              <a:rPr lang="en-US" sz="1400" i="1" dirty="0" err="1">
-                <a:solidFill>
-                  <a:schemeClr val="tx1">
-                    <a:lumMod val="50000"/>
-                    <a:lumOff val="50000"/>
-                  </a:schemeClr>
-                </a:solidFill>
-              </a:rPr>
-              <a:t>cambios</a:t>
-            </a:r>
-            <a:r>
-              <a:rPr lang="en-US" sz="1400" i="1" dirty="0">
-                <a:solidFill>
-                  <a:schemeClr val="tx1">
-                    <a:lumMod val="50000"/>
-                    <a:lumOff val="50000"/>
-                  </a:schemeClr>
-                </a:solidFill>
-              </a:rPr>
-              <a:t> al </a:t>
-            </a:r>
-            <a:r>
-              <a:rPr lang="en-US" sz="1400" i="1" dirty="0" err="1">
-                <a:solidFill>
-                  <a:schemeClr val="tx1">
-                    <a:lumMod val="50000"/>
-                    <a:lumOff val="50000"/>
-                  </a:schemeClr>
-                </a:solidFill>
-              </a:rPr>
-              <a:t>repositorio</a:t>
-            </a:r>
-            <a:r>
-              <a:rPr lang="en-US" sz="1400" i="1" dirty="0">
-                <a:solidFill>
-                  <a:schemeClr val="tx1">
-                    <a:lumMod val="50000"/>
-                    <a:lumOff val="50000"/>
-                  </a:schemeClr>
-                </a:solidFill>
-              </a:rPr>
-              <a:t> </a:t>
-            </a:r>
-            <a:r>
-              <a:rPr lang="en-US" sz="1400" i="1" dirty="0" err="1">
-                <a:solidFill>
-                  <a:schemeClr val="tx1">
-                    <a:lumMod val="50000"/>
-                    <a:lumOff val="50000"/>
-                  </a:schemeClr>
-                </a:solidFill>
-              </a:rPr>
-              <a:t>remoto</a:t>
-            </a:r>
-            <a:endParaRPr lang="en-US" sz="1400" i="1" dirty="0">
-              <a:solidFill>
-                <a:schemeClr val="tx1">
-                  <a:lumMod val="50000"/>
-                  <a:lumOff val="50000"/>
-                </a:schemeClr>
-              </a:solidFill>
-            </a:endParaRPr>
-          </a:p>
-        </p:txBody>
-      </p:sp>
-    </p:spTree>
-    <p:extLst>
-      <p:ext uri="{BB962C8B-B14F-4D97-AF65-F5344CB8AC3E}">
-        <p14:creationId xmlns:p14="http://schemas.microsoft.com/office/powerpoint/2010/main" val="1313185059"/>
-      </p:ext>
-    </p:extLst>
-  </p:cSld>
-  <p:clrMapOvr>
-    <a:masterClrMapping/>
-  </p:clrMapOvr>
-</p:sld>
-</file>
-
-<file path=ppt/slides/slide8.xml><?xml version="1.0" encoding="utf-8"?>
-<p:sld xmlns:a="http://schemas.openxmlformats.org/drawingml/2006/main" xmlns:r="http://schemas.openxmlformats.org/officeDocument/2006/relationships" xmlns:p="http://schemas.openxmlformats.org/presentationml/2006/main">
-  <p:cSld>
-    <p:spTree>
-      <p:nvGrpSpPr>
-        <p:cNvPr id="1" name=""/>
-        <p:cNvGrpSpPr/>
-        <p:nvPr/>
-      </p:nvGrpSpPr>
-      <p:grpSpPr>
-        <a:xfrm>
-          <a:off x="0" y="0"/>
-          <a:ext cx="0" cy="0"/>
-          <a:chOff x="0" y="0"/>
-          <a:chExt cx="0" cy="0"/>
-        </a:xfrm>
-      </p:grpSpPr>
-      <p:sp>
-        <p:nvSpPr>
-          <p:cNvPr id="2" name="Título 1">
-            <a:extLst>
-              <a:ext uri="{FF2B5EF4-FFF2-40B4-BE49-F238E27FC236}">
-                <a16:creationId xmlns:a16="http://schemas.microsoft.com/office/drawing/2014/main" id="{27FF1D4E-B4F2-986E-F4C3-5A1E22D3DB2B}"/>
-              </a:ext>
-            </a:extLst>
-          </p:cNvPr>
-          <p:cNvSpPr>
-            <a:spLocks noGrp="1"/>
-          </p:cNvSpPr>
-          <p:nvPr>
-            <p:ph type="title"/>
-          </p:nvPr>
-        </p:nvSpPr>
-        <p:spPr/>
-        <p:txBody>
-          <a:bodyPr/>
-          <a:lstStyle/>
-          <a:p>
-            <a:r>
-              <a:rPr lang="en-US" dirty="0" err="1"/>
-              <a:t>Componentes</a:t>
-            </a:r>
-            <a:endParaRPr lang="en-US" dirty="0"/>
-          </a:p>
-        </p:txBody>
-      </p:sp>
-      <p:pic>
-        <p:nvPicPr>
-          <p:cNvPr id="5" name="Marcador de contenido 4" descr="Icono&#10;&#10;El contenido generado por IA puede ser incorrecto.">
-            <a:extLst>
-              <a:ext uri="{FF2B5EF4-FFF2-40B4-BE49-F238E27FC236}">
-                <a16:creationId xmlns:a16="http://schemas.microsoft.com/office/drawing/2014/main" id="{36F64D5B-F59D-6824-1C8E-BB760B8978A0}"/>
-              </a:ext>
-            </a:extLst>
-          </p:cNvPr>
-          <p:cNvPicPr>
-            <a:picLocks noGrp="1" noChangeAspect="1"/>
-          </p:cNvPicPr>
-          <p:nvPr>
-            <p:ph idx="1"/>
-          </p:nvPr>
-        </p:nvPicPr>
-        <p:blipFill>
-          <a:blip r:embed="rId2"/>
-          <a:stretch>
-            <a:fillRect/>
-          </a:stretch>
-        </p:blipFill>
-        <p:spPr>
-          <a:xfrm>
-            <a:off x="4651812" y="2250059"/>
-            <a:ext cx="4022725" cy="4022725"/>
-          </a:xfrm>
-        </p:spPr>
-      </p:pic>
-      <p:pic>
-        <p:nvPicPr>
-          <p:cNvPr id="7" name="Imagen 6" descr="Imagen que contiene Logotipo&#10;&#10;El contenido generado por IA puede ser incorrecto.">
-            <a:extLst>
-              <a:ext uri="{FF2B5EF4-FFF2-40B4-BE49-F238E27FC236}">
-                <a16:creationId xmlns:a16="http://schemas.microsoft.com/office/drawing/2014/main" id="{5B49E065-741B-CFAA-04F8-519C38D816E4}"/>
-              </a:ext>
-            </a:extLst>
-          </p:cNvPr>
-          <p:cNvPicPr>
-            <a:picLocks noChangeAspect="1"/>
-          </p:cNvPicPr>
-          <p:nvPr/>
-        </p:nvPicPr>
-        <p:blipFill>
-          <a:blip r:embed="rId3"/>
-          <a:stretch>
-            <a:fillRect/>
-          </a:stretch>
-        </p:blipFill>
-        <p:spPr>
-          <a:xfrm>
-            <a:off x="8933656" y="3280981"/>
-            <a:ext cx="1960880" cy="1960880"/>
-          </a:xfrm>
-          <a:prstGeom prst="rect">
-            <a:avLst/>
-          </a:prstGeom>
-        </p:spPr>
-      </p:pic>
-      <p:pic>
-        <p:nvPicPr>
-          <p:cNvPr id="10" name="Imagen 9">
-            <a:extLst>
-              <a:ext uri="{FF2B5EF4-FFF2-40B4-BE49-F238E27FC236}">
-                <a16:creationId xmlns:a16="http://schemas.microsoft.com/office/drawing/2014/main" id="{5D59F7AB-70B1-ECAA-4279-17649D31BE7F}"/>
-              </a:ext>
-            </a:extLst>
-          </p:cNvPr>
-          <p:cNvPicPr>
-            <a:picLocks noChangeAspect="1"/>
-          </p:cNvPicPr>
-          <p:nvPr/>
-        </p:nvPicPr>
-        <p:blipFill>
-          <a:blip r:embed="rId4"/>
-          <a:stretch>
-            <a:fillRect/>
-          </a:stretch>
-        </p:blipFill>
-        <p:spPr>
-          <a:xfrm>
-            <a:off x="625793" y="2250059"/>
-            <a:ext cx="3671888" cy="4167239"/>
-          </a:xfrm>
-          <a:prstGeom prst="rect">
-            <a:avLst/>
-          </a:prstGeom>
-        </p:spPr>
-      </p:pic>
-    </p:spTree>
-    <p:extLst>
-      <p:ext uri="{BB962C8B-B14F-4D97-AF65-F5344CB8AC3E}">
-        <p14:creationId xmlns:p14="http://schemas.microsoft.com/office/powerpoint/2010/main" val="1772268369"/>
-      </p:ext>
-    </p:extLst>
-  </p:cSld>
-  <p:clrMapOvr>
-    <a:masterClrMapping/>
-  </p:clrMapOvr>
-</p:sld>
-</file>
-
-<file path=ppt/slides/slide9.xml><?xml version="1.0" encoding="utf-8"?>
-<p:sld xmlns:a="http://schemas.openxmlformats.org/drawingml/2006/main" xmlns:r="http://schemas.openxmlformats.org/officeDocument/2006/relationships" xmlns:p="http://schemas.openxmlformats.org/presentationml/2006/main">
-  <p:cSld>
-    <p:spTree>
-      <p:nvGrpSpPr>
-        <p:cNvPr id="1" name=""/>
-        <p:cNvGrpSpPr/>
-        <p:nvPr/>
-      </p:nvGrpSpPr>
-      <p:grpSpPr>
-        <a:xfrm>
-          <a:off x="0" y="0"/>
-          <a:ext cx="0" cy="0"/>
-          <a:chOff x="0" y="0"/>
-          <a:chExt cx="0" cy="0"/>
-        </a:xfrm>
-      </p:grpSpPr>
-      <p:sp>
-        <p:nvSpPr>
-          <p:cNvPr id="2" name="Título 1">
-            <a:extLst>
-              <a:ext uri="{FF2B5EF4-FFF2-40B4-BE49-F238E27FC236}">
-                <a16:creationId xmlns:a16="http://schemas.microsoft.com/office/drawing/2014/main" id="{9E7E7F76-C6FA-7151-9A5D-E60DFD9C212A}"/>
-              </a:ext>
-            </a:extLst>
-          </p:cNvPr>
-          <p:cNvSpPr>
-            <a:spLocks noGrp="1"/>
-          </p:cNvSpPr>
-          <p:nvPr>
-            <p:ph type="title"/>
-          </p:nvPr>
-        </p:nvSpPr>
-        <p:spPr/>
-        <p:txBody>
-          <a:bodyPr/>
-          <a:lstStyle/>
-          <a:p>
-            <a:r>
-              <a:rPr lang="en-US" dirty="0" err="1"/>
-              <a:t>Clases</a:t>
-            </a:r>
-            <a:r>
-              <a:rPr lang="en-US" dirty="0"/>
-              <a:t> e interfaces </a:t>
-            </a:r>
-            <a:r>
-              <a:rPr lang="en-US" dirty="0" err="1"/>
-              <a:t>en</a:t>
-            </a:r>
-            <a:r>
-              <a:rPr lang="en-US" dirty="0"/>
-              <a:t> Java</a:t>
-            </a:r>
-          </a:p>
-        </p:txBody>
-      </p:sp>
-      <p:pic>
-        <p:nvPicPr>
-          <p:cNvPr id="11" name="Imagen 10" descr="Texto&#10;&#10;El contenido generado por IA puede ser incorrecto.">
-            <a:extLst>
-              <a:ext uri="{FF2B5EF4-FFF2-40B4-BE49-F238E27FC236}">
-                <a16:creationId xmlns:a16="http://schemas.microsoft.com/office/drawing/2014/main" id="{A2960970-DF40-42A7-373E-5025539D5C9F}"/>
-              </a:ext>
-            </a:extLst>
-          </p:cNvPr>
-          <p:cNvPicPr>
-            <a:picLocks noChangeAspect="1"/>
-          </p:cNvPicPr>
-          <p:nvPr/>
-        </p:nvPicPr>
-        <p:blipFill>
-          <a:blip r:embed="rId2"/>
-          <a:stretch>
-            <a:fillRect/>
-          </a:stretch>
-        </p:blipFill>
-        <p:spPr>
-          <a:xfrm>
-            <a:off x="410987" y="2278997"/>
-            <a:ext cx="5685013" cy="3619814"/>
-          </a:xfrm>
-          <a:prstGeom prst="rect">
-            <a:avLst/>
-          </a:prstGeom>
-        </p:spPr>
-      </p:pic>
-      <p:pic>
-        <p:nvPicPr>
-          <p:cNvPr id="14" name="Marcador de contenido 4" descr="Texto&#10;&#10;El contenido generado por IA puede ser incorrecto.">
-            <a:extLst>
-              <a:ext uri="{FF2B5EF4-FFF2-40B4-BE49-F238E27FC236}">
-                <a16:creationId xmlns:a16="http://schemas.microsoft.com/office/drawing/2014/main" id="{D9A302C4-4163-1D8F-0770-ADEBFCB9AECF}"/>
-              </a:ext>
-            </a:extLst>
-          </p:cNvPr>
-          <p:cNvPicPr>
-            <a:picLocks noGrp="1" noChangeAspect="1"/>
-          </p:cNvPicPr>
-          <p:nvPr>
-            <p:ph idx="1"/>
-          </p:nvPr>
-        </p:nvPicPr>
-        <p:blipFill>
-          <a:blip r:embed="rId3"/>
-          <a:stretch>
-            <a:fillRect/>
-          </a:stretch>
-        </p:blipFill>
-        <p:spPr>
-          <a:xfrm>
-            <a:off x="6721270" y="2278997"/>
-            <a:ext cx="4778154" cy="1729890"/>
-          </a:xfrm>
-        </p:spPr>
-      </p:pic>
-      <p:pic>
-        <p:nvPicPr>
-          <p:cNvPr id="18" name="Imagen 17" descr="Texto&#10;&#10;El contenido generado por IA puede ser incorrecto.">
-            <a:extLst>
-              <a:ext uri="{FF2B5EF4-FFF2-40B4-BE49-F238E27FC236}">
-                <a16:creationId xmlns:a16="http://schemas.microsoft.com/office/drawing/2014/main" id="{0F6EC383-6D26-3A5E-D73C-2043D8F3480D}"/>
-              </a:ext>
-            </a:extLst>
-          </p:cNvPr>
-          <p:cNvPicPr>
-            <a:picLocks noChangeAspect="1"/>
-          </p:cNvPicPr>
-          <p:nvPr/>
-        </p:nvPicPr>
-        <p:blipFill>
-          <a:blip r:embed="rId4"/>
-          <a:stretch>
-            <a:fillRect/>
-          </a:stretch>
-        </p:blipFill>
-        <p:spPr>
-          <a:xfrm>
-            <a:off x="6721270" y="4449871"/>
-            <a:ext cx="4221846" cy="2408129"/>
-          </a:xfrm>
-          <a:prstGeom prst="rect">
-            <a:avLst/>
-          </a:prstGeom>
-        </p:spPr>
-      </p:pic>
-      <p:sp>
-        <p:nvSpPr>
-          <p:cNvPr id="19" name="CuadroTexto 18">
-            <a:extLst>
-              <a:ext uri="{FF2B5EF4-FFF2-40B4-BE49-F238E27FC236}">
-                <a16:creationId xmlns:a16="http://schemas.microsoft.com/office/drawing/2014/main" id="{4F1854D0-5B91-A97E-A655-413FC7960AC6}"/>
-              </a:ext>
-            </a:extLst>
-          </p:cNvPr>
-          <p:cNvSpPr txBox="1"/>
-          <p:nvPr/>
-        </p:nvSpPr>
-        <p:spPr>
-          <a:xfrm>
-            <a:off x="410987" y="1971220"/>
-            <a:ext cx="1691232" cy="307777"/>
-          </a:xfrm>
-          <a:prstGeom prst="rect">
-            <a:avLst/>
-          </a:prstGeom>
-          <a:noFill/>
-        </p:spPr>
-        <p:txBody>
-          <a:bodyPr wrap="none" rtlCol="0">
-            <a:spAutoFit/>
-          </a:bodyPr>
-          <a:lstStyle/>
-          <a:p>
-            <a:r>
-              <a:rPr lang="en-US" sz="1400" i="1" dirty="0">
-                <a:solidFill>
-                  <a:schemeClr val="tx1">
-                    <a:lumMod val="50000"/>
-                    <a:lumOff val="50000"/>
-                  </a:schemeClr>
-                </a:solidFill>
-              </a:rPr>
-              <a:t>Clase </a:t>
-            </a:r>
-            <a:r>
-              <a:rPr lang="en-US" sz="1400" i="1" dirty="0" err="1">
-                <a:solidFill>
-                  <a:schemeClr val="tx1">
-                    <a:lumMod val="50000"/>
-                    <a:lumOff val="50000"/>
-                  </a:schemeClr>
-                </a:solidFill>
-              </a:rPr>
-              <a:t>modelo</a:t>
-            </a:r>
-            <a:r>
-              <a:rPr lang="en-US" sz="1400" i="1" dirty="0">
-                <a:solidFill>
-                  <a:schemeClr val="tx1">
-                    <a:lumMod val="50000"/>
-                    <a:lumOff val="50000"/>
-                  </a:schemeClr>
-                </a:solidFill>
-              </a:rPr>
-              <a:t> “</a:t>
-            </a:r>
-            <a:r>
-              <a:rPr lang="en-US" sz="1400" i="1" dirty="0" err="1">
-                <a:solidFill>
-                  <a:schemeClr val="tx1">
-                    <a:lumMod val="50000"/>
-                    <a:lumOff val="50000"/>
-                  </a:schemeClr>
-                </a:solidFill>
-              </a:rPr>
-              <a:t>Curso</a:t>
-            </a:r>
-            <a:r>
-              <a:rPr lang="en-US" sz="1400" i="1" dirty="0">
-                <a:solidFill>
-                  <a:schemeClr val="tx1">
-                    <a:lumMod val="50000"/>
-                    <a:lumOff val="50000"/>
-                  </a:schemeClr>
-                </a:solidFill>
-              </a:rPr>
-              <a:t>”</a:t>
-            </a:r>
-          </a:p>
-        </p:txBody>
-      </p:sp>
-      <p:sp>
-        <p:nvSpPr>
-          <p:cNvPr id="20" name="CuadroTexto 19">
-            <a:extLst>
-              <a:ext uri="{FF2B5EF4-FFF2-40B4-BE49-F238E27FC236}">
-                <a16:creationId xmlns:a16="http://schemas.microsoft.com/office/drawing/2014/main" id="{874FEEC8-65C4-81B1-9D73-9C8385EED7D4}"/>
-              </a:ext>
-            </a:extLst>
-          </p:cNvPr>
-          <p:cNvSpPr txBox="1"/>
-          <p:nvPr/>
-        </p:nvSpPr>
-        <p:spPr>
-          <a:xfrm>
-            <a:off x="6709141" y="1971219"/>
-            <a:ext cx="4264309" cy="307777"/>
-          </a:xfrm>
-          <a:prstGeom prst="rect">
-            <a:avLst/>
-          </a:prstGeom>
-          <a:noFill/>
-        </p:spPr>
-        <p:txBody>
-          <a:bodyPr wrap="none" rtlCol="0">
-            <a:spAutoFit/>
-          </a:bodyPr>
-          <a:lstStyle/>
-          <a:p>
-            <a:r>
-              <a:rPr lang="en-US" sz="1400" i="1" dirty="0" err="1">
-                <a:solidFill>
-                  <a:schemeClr val="tx1">
-                    <a:lumMod val="50000"/>
-                    <a:lumOff val="50000"/>
-                  </a:schemeClr>
-                </a:solidFill>
-              </a:rPr>
-              <a:t>Interfaz</a:t>
-            </a:r>
-            <a:r>
-              <a:rPr lang="en-US" sz="1400" i="1" dirty="0">
-                <a:solidFill>
-                  <a:schemeClr val="tx1">
-                    <a:lumMod val="50000"/>
-                    <a:lumOff val="50000"/>
-                  </a:schemeClr>
-                </a:solidFill>
-              </a:rPr>
-              <a:t> “</a:t>
-            </a:r>
-            <a:r>
-              <a:rPr lang="en-US" sz="1400" i="1" dirty="0" err="1">
-                <a:solidFill>
-                  <a:schemeClr val="tx1">
-                    <a:lumMod val="50000"/>
-                    <a:lumOff val="50000"/>
-                  </a:schemeClr>
-                </a:solidFill>
-              </a:rPr>
-              <a:t>repositorio</a:t>
-            </a:r>
-            <a:r>
-              <a:rPr lang="en-US" sz="1400" i="1" dirty="0">
-                <a:solidFill>
-                  <a:schemeClr val="tx1">
-                    <a:lumMod val="50000"/>
-                    <a:lumOff val="50000"/>
-                  </a:schemeClr>
-                </a:solidFill>
-              </a:rPr>
-              <a:t>”, </a:t>
-            </a:r>
-            <a:r>
-              <a:rPr lang="en-US" sz="1400" i="1" dirty="0" err="1">
-                <a:solidFill>
-                  <a:schemeClr val="tx1">
-                    <a:lumMod val="50000"/>
-                    <a:lumOff val="50000"/>
-                  </a:schemeClr>
-                </a:solidFill>
-              </a:rPr>
-              <a:t>permite</a:t>
-            </a:r>
-            <a:r>
-              <a:rPr lang="en-US" sz="1400" i="1" dirty="0">
-                <a:solidFill>
-                  <a:schemeClr val="tx1">
-                    <a:lumMod val="50000"/>
-                    <a:lumOff val="50000"/>
-                  </a:schemeClr>
-                </a:solidFill>
-              </a:rPr>
-              <a:t> manipular la Base de Datos</a:t>
-            </a:r>
-          </a:p>
-        </p:txBody>
-      </p:sp>
-      <p:sp>
-        <p:nvSpPr>
-          <p:cNvPr id="21" name="CuadroTexto 20">
-            <a:extLst>
-              <a:ext uri="{FF2B5EF4-FFF2-40B4-BE49-F238E27FC236}">
-                <a16:creationId xmlns:a16="http://schemas.microsoft.com/office/drawing/2014/main" id="{3C84E1EC-7266-8C45-D6F3-2DF063B1A90B}"/>
-              </a:ext>
-            </a:extLst>
-          </p:cNvPr>
-          <p:cNvSpPr txBox="1"/>
-          <p:nvPr/>
-        </p:nvSpPr>
-        <p:spPr>
-          <a:xfrm>
-            <a:off x="6721270" y="4142094"/>
-            <a:ext cx="1422184" cy="307777"/>
-          </a:xfrm>
-          <a:prstGeom prst="rect">
-            <a:avLst/>
-          </a:prstGeom>
-          <a:noFill/>
-        </p:spPr>
-        <p:txBody>
-          <a:bodyPr wrap="none" rtlCol="0">
-            <a:spAutoFit/>
-          </a:bodyPr>
-          <a:lstStyle/>
-          <a:p>
-            <a:r>
-              <a:rPr lang="en-US" sz="1400" i="1" dirty="0" err="1">
-                <a:solidFill>
-                  <a:schemeClr val="tx1">
-                    <a:lumMod val="50000"/>
-                    <a:lumOff val="50000"/>
-                  </a:schemeClr>
-                </a:solidFill>
-              </a:rPr>
-              <a:t>Interfaz</a:t>
-            </a:r>
-            <a:r>
-              <a:rPr lang="en-US" sz="1400" i="1" dirty="0">
-                <a:solidFill>
-                  <a:schemeClr val="tx1">
-                    <a:lumMod val="50000"/>
-                    <a:lumOff val="50000"/>
-                  </a:schemeClr>
-                </a:solidFill>
-              </a:rPr>
-              <a:t> “</a:t>
-            </a:r>
-            <a:r>
-              <a:rPr lang="en-US" sz="1400" i="1" dirty="0" err="1">
-                <a:solidFill>
-                  <a:schemeClr val="tx1">
-                    <a:lumMod val="50000"/>
-                    <a:lumOff val="50000"/>
-                  </a:schemeClr>
-                </a:solidFill>
-              </a:rPr>
-              <a:t>servicio</a:t>
-            </a:r>
-            <a:r>
-              <a:rPr lang="en-US" sz="1400" i="1" dirty="0">
-                <a:solidFill>
-                  <a:schemeClr val="tx1">
-                    <a:lumMod val="50000"/>
-                    <a:lumOff val="50000"/>
-                  </a:schemeClr>
-                </a:solidFill>
-              </a:rPr>
-              <a:t>”</a:t>
-            </a:r>
-          </a:p>
-        </p:txBody>
-      </p:sp>
-    </p:spTree>
-    <p:extLst>
-      <p:ext uri="{BB962C8B-B14F-4D97-AF65-F5344CB8AC3E}">
-        <p14:creationId xmlns:p14="http://schemas.microsoft.com/office/powerpoint/2010/main" val="3537248375"/>
+        <p14:creationId xmlns:p14="http://schemas.microsoft.com/office/powerpoint/2010/main" val="1020832159"/>
       </p:ext>
     </p:extLst>
   </p:cSld>

</xml_diff>